<commit_message>
Name matrices in figures
</commit_message>
<xml_diff>
--- a/images/figures.pptx
+++ b/images/figures.pptx
@@ -5,7 +5,7 @@
     <p:sldMasterId id="2147483648" r:id="rId1"/>
   </p:sldMasterIdLst>
   <p:notesMasterIdLst>
-    <p:notesMasterId r:id="rId12"/>
+    <p:notesMasterId r:id="rId17"/>
   </p:notesMasterIdLst>
   <p:sldIdLst>
     <p:sldId id="256" r:id="rId2"/>
@@ -17,7 +17,12 @@
     <p:sldId id="263" r:id="rId8"/>
     <p:sldId id="264" r:id="rId9"/>
     <p:sldId id="265" r:id="rId10"/>
-    <p:sldId id="260" r:id="rId11"/>
+    <p:sldId id="266" r:id="rId11"/>
+    <p:sldId id="260" r:id="rId12"/>
+    <p:sldId id="267" r:id="rId13"/>
+    <p:sldId id="270" r:id="rId14"/>
+    <p:sldId id="269" r:id="rId15"/>
+    <p:sldId id="268" r:id="rId16"/>
   </p:sldIdLst>
   <p:sldSz cx="12192000" cy="6858000"/>
   <p:notesSz cx="6858000" cy="9144000"/>
@@ -643,6 +648,90 @@
     <p:extLst>
       <p:ext uri="{BB962C8B-B14F-4D97-AF65-F5344CB8AC3E}">
         <p14:creationId xmlns:p14="http://schemas.microsoft.com/office/powerpoint/2010/main" val="421617349"/>
+      </p:ext>
+    </p:extLst>
+  </p:cSld>
+  <p:clrMapOvr>
+    <a:masterClrMapping/>
+  </p:clrMapOvr>
+</p:notes>
+</file>
+
+<file path=ppt/notesSlides/notesSlide3.xml><?xml version="1.0" encoding="utf-8"?>
+<p:notes xmlns:a="http://schemas.openxmlformats.org/drawingml/2006/main" xmlns:r="http://schemas.openxmlformats.org/officeDocument/2006/relationships" xmlns:p="http://schemas.openxmlformats.org/presentationml/2006/main">
+  <p:cSld>
+    <p:spTree>
+      <p:nvGrpSpPr>
+        <p:cNvPr id="1" name=""/>
+        <p:cNvGrpSpPr/>
+        <p:nvPr/>
+      </p:nvGrpSpPr>
+      <p:grpSpPr>
+        <a:xfrm>
+          <a:off x="0" y="0"/>
+          <a:ext cx="0" cy="0"/>
+          <a:chOff x="0" y="0"/>
+          <a:chExt cx="0" cy="0"/>
+        </a:xfrm>
+      </p:grpSpPr>
+      <p:sp>
+        <p:nvSpPr>
+          <p:cNvPr id="2" name="Espace réservé de l’image des diapositives 1"/>
+          <p:cNvSpPr>
+            <a:spLocks noGrp="1" noRot="1" noChangeAspect="1"/>
+          </p:cNvSpPr>
+          <p:nvPr>
+            <p:ph type="sldImg"/>
+          </p:nvPr>
+        </p:nvSpPr>
+        <p:spPr/>
+      </p:sp>
+      <p:sp>
+        <p:nvSpPr>
+          <p:cNvPr id="3" name="Espace réservé des notes 2"/>
+          <p:cNvSpPr>
+            <a:spLocks noGrp="1"/>
+          </p:cNvSpPr>
+          <p:nvPr>
+            <p:ph type="body" idx="1"/>
+          </p:nvPr>
+        </p:nvSpPr>
+        <p:spPr/>
+        <p:txBody>
+          <a:bodyPr/>
+          <a:lstStyle/>
+          <a:p>
+            <a:endParaRPr lang="fr-FR" dirty="0"/>
+          </a:p>
+        </p:txBody>
+      </p:sp>
+      <p:sp>
+        <p:nvSpPr>
+          <p:cNvPr id="4" name="Espace réservé du numéro de diapositive 3"/>
+          <p:cNvSpPr>
+            <a:spLocks noGrp="1"/>
+          </p:cNvSpPr>
+          <p:nvPr>
+            <p:ph type="sldNum" sz="quarter" idx="10"/>
+          </p:nvPr>
+        </p:nvSpPr>
+        <p:spPr/>
+        <p:txBody>
+          <a:bodyPr/>
+          <a:lstStyle/>
+          <a:p>
+            <a:fld id="{BE29C999-6D12-7F4A-851A-AAF2300E72C6}" type="slidenum">
+              <a:rPr lang="fr-FR" smtClean="0"/>
+              <a:t>10</a:t>
+            </a:fld>
+            <a:endParaRPr lang="fr-FR"/>
+          </a:p>
+        </p:txBody>
+      </p:sp>
+    </p:spTree>
+    <p:extLst>
+      <p:ext uri="{BB962C8B-B14F-4D97-AF65-F5344CB8AC3E}">
+        <p14:creationId xmlns:p14="http://schemas.microsoft.com/office/powerpoint/2010/main" val="2866069835"/>
       </p:ext>
     </p:extLst>
   </p:cSld>
@@ -4027,10 +4116,2127 @@
           <a:chExt cx="0" cy="0"/>
         </a:xfrm>
       </p:grpSpPr>
+      <p:sp>
+        <p:nvSpPr>
+          <p:cNvPr id="28" name="ZoneTexte 27">
+            <a:extLst>
+              <a:ext uri="{FF2B5EF4-FFF2-40B4-BE49-F238E27FC236}">
+                <a16:creationId xmlns:a16="http://schemas.microsoft.com/office/drawing/2014/main" id="{8AB0A87A-B5D0-4D48-A48F-6D3D94181BBC}"/>
+              </a:ext>
+            </a:extLst>
+          </p:cNvPr>
+          <p:cNvSpPr txBox="1"/>
+          <p:nvPr/>
+        </p:nvSpPr>
+        <p:spPr>
+          <a:xfrm>
+            <a:off x="0" y="0"/>
+            <a:ext cx="3505200" cy="369332"/>
+          </a:xfrm>
+          <a:prstGeom prst="rect">
+            <a:avLst/>
+          </a:prstGeom>
+          <a:noFill/>
+        </p:spPr>
+        <p:txBody>
+          <a:bodyPr wrap="square" rtlCol="0">
+            <a:spAutoFit/>
+          </a:bodyPr>
+          <a:lstStyle/>
+          <a:p>
+            <a:r>
+              <a:rPr lang="fr-FR" dirty="0" err="1"/>
+              <a:t>Linear</a:t>
+            </a:r>
+            <a:r>
+              <a:rPr lang="fr-FR" dirty="0"/>
+              <a:t> </a:t>
+            </a:r>
+            <a:r>
+              <a:rPr lang="fr-FR" dirty="0" err="1"/>
+              <a:t>Elastic</a:t>
+            </a:r>
+            <a:endParaRPr lang="fr-FR" dirty="0"/>
+          </a:p>
+        </p:txBody>
+      </p:sp>
+      <p:grpSp>
+        <p:nvGrpSpPr>
+          <p:cNvPr id="2" name="Groupe 1">
+            <a:extLst>
+              <a:ext uri="{FF2B5EF4-FFF2-40B4-BE49-F238E27FC236}">
+                <a16:creationId xmlns:a16="http://schemas.microsoft.com/office/drawing/2014/main" id="{596902ED-C378-5840-94EC-248343D11691}"/>
+              </a:ext>
+            </a:extLst>
+          </p:cNvPr>
+          <p:cNvGrpSpPr/>
+          <p:nvPr/>
+        </p:nvGrpSpPr>
+        <p:grpSpPr>
+          <a:xfrm>
+            <a:off x="50801" y="1681694"/>
+            <a:ext cx="11760054" cy="2891493"/>
+            <a:chOff x="50801" y="1681694"/>
+            <a:chExt cx="11760054" cy="2891493"/>
+          </a:xfrm>
+        </p:grpSpPr>
+        <p:pic>
+          <p:nvPicPr>
+            <p:cNvPr id="13" name="Image 12">
+              <a:extLst>
+                <a:ext uri="{FF2B5EF4-FFF2-40B4-BE49-F238E27FC236}">
+                  <a16:creationId xmlns:a16="http://schemas.microsoft.com/office/drawing/2014/main" id="{07834DE5-3117-9641-9A96-5C11777482AA}"/>
+                </a:ext>
+              </a:extLst>
+            </p:cNvPr>
+            <p:cNvPicPr>
+              <a:picLocks/>
+            </p:cNvPicPr>
+            <p:nvPr/>
+          </p:nvPicPr>
+          <p:blipFill rotWithShape="1">
+            <a:blip r:embed="rId3"/>
+            <a:srcRect l="13223" t="7690" r="9808" b="11300"/>
+            <a:stretch/>
+          </p:blipFill>
+          <p:spPr>
+            <a:xfrm rot="5400000">
+              <a:off x="1619298" y="724165"/>
+              <a:ext cx="224138" cy="2241383"/>
+            </a:xfrm>
+            <a:prstGeom prst="rect">
+              <a:avLst/>
+            </a:prstGeom>
+          </p:spPr>
+        </p:pic>
+        <p:pic>
+          <p:nvPicPr>
+            <p:cNvPr id="15" name="Image 14">
+              <a:extLst>
+                <a:ext uri="{FF2B5EF4-FFF2-40B4-BE49-F238E27FC236}">
+                  <a16:creationId xmlns:a16="http://schemas.microsoft.com/office/drawing/2014/main" id="{3488EA01-611B-634E-9754-1F96822AA0FE}"/>
+                </a:ext>
+              </a:extLst>
+            </p:cNvPr>
+            <p:cNvPicPr>
+              <a:picLocks/>
+            </p:cNvPicPr>
+            <p:nvPr/>
+          </p:nvPicPr>
+          <p:blipFill rotWithShape="1">
+            <a:blip r:embed="rId4"/>
+            <a:srcRect l="13223" t="7690" r="9808" b="11300"/>
+            <a:stretch/>
+          </p:blipFill>
+          <p:spPr>
+            <a:xfrm>
+              <a:off x="388343" y="1949022"/>
+              <a:ext cx="224138" cy="2241383"/>
+            </a:xfrm>
+            <a:prstGeom prst="rect">
+              <a:avLst/>
+            </a:prstGeom>
+          </p:spPr>
+        </p:pic>
+        <p:pic>
+          <p:nvPicPr>
+            <p:cNvPr id="16" name="Image 15">
+              <a:extLst>
+                <a:ext uri="{FF2B5EF4-FFF2-40B4-BE49-F238E27FC236}">
+                  <a16:creationId xmlns:a16="http://schemas.microsoft.com/office/drawing/2014/main" id="{F4AA47A1-155F-DB48-A918-1972FDF6BDB0}"/>
+                </a:ext>
+              </a:extLst>
+            </p:cNvPr>
+            <p:cNvPicPr>
+              <a:picLocks/>
+            </p:cNvPicPr>
+            <p:nvPr/>
+          </p:nvPicPr>
+          <p:blipFill rotWithShape="1">
+            <a:blip r:embed="rId3"/>
+            <a:srcRect l="13223" t="7690" r="9808" b="11300"/>
+            <a:stretch/>
+          </p:blipFill>
+          <p:spPr>
+            <a:xfrm rot="5400000">
+              <a:off x="4605565" y="707771"/>
+              <a:ext cx="224138" cy="2241383"/>
+            </a:xfrm>
+            <a:prstGeom prst="rect">
+              <a:avLst/>
+            </a:prstGeom>
+          </p:spPr>
+        </p:pic>
+        <p:pic>
+          <p:nvPicPr>
+            <p:cNvPr id="17" name="Image 16">
+              <a:extLst>
+                <a:ext uri="{FF2B5EF4-FFF2-40B4-BE49-F238E27FC236}">
+                  <a16:creationId xmlns:a16="http://schemas.microsoft.com/office/drawing/2014/main" id="{E1733AD3-9DF0-F44E-8E45-A6C32F5D540E}"/>
+                </a:ext>
+              </a:extLst>
+            </p:cNvPr>
+            <p:cNvPicPr>
+              <a:picLocks/>
+            </p:cNvPicPr>
+            <p:nvPr/>
+          </p:nvPicPr>
+          <p:blipFill rotWithShape="1">
+            <a:blip r:embed="rId3"/>
+            <a:srcRect l="13223" t="7690" r="9808" b="11300"/>
+            <a:stretch/>
+          </p:blipFill>
+          <p:spPr>
+            <a:xfrm rot="5400000">
+              <a:off x="7591830" y="724164"/>
+              <a:ext cx="224138" cy="2241383"/>
+            </a:xfrm>
+            <a:prstGeom prst="rect">
+              <a:avLst/>
+            </a:prstGeom>
+          </p:spPr>
+        </p:pic>
+        <p:pic>
+          <p:nvPicPr>
+            <p:cNvPr id="18" name="Image 17">
+              <a:extLst>
+                <a:ext uri="{FF2B5EF4-FFF2-40B4-BE49-F238E27FC236}">
+                  <a16:creationId xmlns:a16="http://schemas.microsoft.com/office/drawing/2014/main" id="{35F17950-179D-4941-A07B-6D87BA551618}"/>
+                </a:ext>
+              </a:extLst>
+            </p:cNvPr>
+            <p:cNvPicPr>
+              <a:picLocks/>
+            </p:cNvPicPr>
+            <p:nvPr/>
+          </p:nvPicPr>
+          <p:blipFill rotWithShape="1">
+            <a:blip r:embed="rId3"/>
+            <a:srcRect l="13223" t="7690" r="9808" b="11300"/>
+            <a:stretch/>
+          </p:blipFill>
+          <p:spPr>
+            <a:xfrm rot="5400000">
+              <a:off x="10568107" y="716261"/>
+              <a:ext cx="224138" cy="2241383"/>
+            </a:xfrm>
+            <a:prstGeom prst="rect">
+              <a:avLst/>
+            </a:prstGeom>
+          </p:spPr>
+        </p:pic>
+        <p:pic>
+          <p:nvPicPr>
+            <p:cNvPr id="19" name="Image 18">
+              <a:extLst>
+                <a:ext uri="{FF2B5EF4-FFF2-40B4-BE49-F238E27FC236}">
+                  <a16:creationId xmlns:a16="http://schemas.microsoft.com/office/drawing/2014/main" id="{42D9BD59-E532-A744-ABF4-D2A6A08C6D3D}"/>
+                </a:ext>
+              </a:extLst>
+            </p:cNvPr>
+            <p:cNvPicPr>
+              <a:picLocks/>
+            </p:cNvPicPr>
+            <p:nvPr/>
+          </p:nvPicPr>
+          <p:blipFill rotWithShape="1">
+            <a:blip r:embed="rId4"/>
+            <a:srcRect l="13223" t="7690" r="9808" b="11300"/>
+            <a:stretch/>
+          </p:blipFill>
+          <p:spPr>
+            <a:xfrm>
+              <a:off x="3372803" y="1943304"/>
+              <a:ext cx="224138" cy="2241383"/>
+            </a:xfrm>
+            <a:prstGeom prst="rect">
+              <a:avLst/>
+            </a:prstGeom>
+          </p:spPr>
+        </p:pic>
+        <p:pic>
+          <p:nvPicPr>
+            <p:cNvPr id="20" name="Image 19">
+              <a:extLst>
+                <a:ext uri="{FF2B5EF4-FFF2-40B4-BE49-F238E27FC236}">
+                  <a16:creationId xmlns:a16="http://schemas.microsoft.com/office/drawing/2014/main" id="{1E9CF464-39BD-E749-BB40-495E55E7B8A7}"/>
+                </a:ext>
+              </a:extLst>
+            </p:cNvPr>
+            <p:cNvPicPr>
+              <a:picLocks/>
+            </p:cNvPicPr>
+            <p:nvPr/>
+          </p:nvPicPr>
+          <p:blipFill rotWithShape="1">
+            <a:blip r:embed="rId4"/>
+            <a:srcRect l="13223" t="7690" r="9808" b="11300"/>
+            <a:stretch/>
+          </p:blipFill>
+          <p:spPr>
+            <a:xfrm>
+              <a:off x="6349079" y="1943304"/>
+              <a:ext cx="224138" cy="2241383"/>
+            </a:xfrm>
+            <a:prstGeom prst="rect">
+              <a:avLst/>
+            </a:prstGeom>
+          </p:spPr>
+        </p:pic>
+        <p:pic>
+          <p:nvPicPr>
+            <p:cNvPr id="21" name="Image 20">
+              <a:extLst>
+                <a:ext uri="{FF2B5EF4-FFF2-40B4-BE49-F238E27FC236}">
+                  <a16:creationId xmlns:a16="http://schemas.microsoft.com/office/drawing/2014/main" id="{A0BEF6D6-FCFF-2F45-B16B-9675F5290155}"/>
+                </a:ext>
+              </a:extLst>
+            </p:cNvPr>
+            <p:cNvPicPr>
+              <a:picLocks/>
+            </p:cNvPicPr>
+            <p:nvPr/>
+          </p:nvPicPr>
+          <p:blipFill rotWithShape="1">
+            <a:blip r:embed="rId4"/>
+            <a:srcRect l="13223" t="7690" r="9808" b="11300"/>
+            <a:stretch/>
+          </p:blipFill>
+          <p:spPr>
+            <a:xfrm>
+              <a:off x="9348944" y="1940531"/>
+              <a:ext cx="224138" cy="2241383"/>
+            </a:xfrm>
+            <a:prstGeom prst="rect">
+              <a:avLst/>
+            </a:prstGeom>
+          </p:spPr>
+        </p:pic>
+        <p:sp>
+          <p:nvSpPr>
+            <p:cNvPr id="23" name="ZoneTexte 22">
+              <a:extLst>
+                <a:ext uri="{FF2B5EF4-FFF2-40B4-BE49-F238E27FC236}">
+                  <a16:creationId xmlns:a16="http://schemas.microsoft.com/office/drawing/2014/main" id="{8553DED1-A13A-8D46-B09B-86FA3812DFA8}"/>
+                </a:ext>
+              </a:extLst>
+            </p:cNvPr>
+            <p:cNvSpPr txBox="1"/>
+            <p:nvPr/>
+          </p:nvSpPr>
+          <p:spPr>
+            <a:xfrm>
+              <a:off x="50801" y="1716393"/>
+              <a:ext cx="610674" cy="261610"/>
+            </a:xfrm>
+            <a:prstGeom prst="rect">
+              <a:avLst/>
+            </a:prstGeom>
+            <a:noFill/>
+          </p:spPr>
+          <p:txBody>
+            <a:bodyPr wrap="square" rtlCol="0">
+              <a:spAutoFit/>
+            </a:bodyPr>
+            <a:lstStyle/>
+            <a:p>
+              <a:pPr algn="r"/>
+              <a:r>
+                <a:rPr lang="fr-FR" sz="1100" dirty="0">
+                  <a:latin typeface="Arial" panose="020B0604020202020204" pitchFamily="34" charset="0"/>
+                  <a:cs typeface="Arial" panose="020B0604020202020204" pitchFamily="34" charset="0"/>
+                </a:rPr>
+                <a:t>4x10</a:t>
+              </a:r>
+              <a:r>
+                <a:rPr lang="fr-FR" sz="1100" baseline="30000" dirty="0">
+                  <a:latin typeface="Arial" panose="020B0604020202020204" pitchFamily="34" charset="0"/>
+                  <a:cs typeface="Arial" panose="020B0604020202020204" pitchFamily="34" charset="0"/>
+                </a:rPr>
+                <a:t>-1</a:t>
+              </a:r>
+            </a:p>
+          </p:txBody>
+        </p:sp>
+        <p:sp>
+          <p:nvSpPr>
+            <p:cNvPr id="24" name="ZoneTexte 23">
+              <a:extLst>
+                <a:ext uri="{FF2B5EF4-FFF2-40B4-BE49-F238E27FC236}">
+                  <a16:creationId xmlns:a16="http://schemas.microsoft.com/office/drawing/2014/main" id="{8C683898-FD4A-EB4D-890C-DD3D0A57F6DF}"/>
+                </a:ext>
+              </a:extLst>
+            </p:cNvPr>
+            <p:cNvSpPr txBox="1"/>
+            <p:nvPr/>
+          </p:nvSpPr>
+          <p:spPr>
+            <a:xfrm>
+              <a:off x="3025277" y="1706147"/>
+              <a:ext cx="607959" cy="261610"/>
+            </a:xfrm>
+            <a:prstGeom prst="rect">
+              <a:avLst/>
+            </a:prstGeom>
+            <a:noFill/>
+          </p:spPr>
+          <p:txBody>
+            <a:bodyPr wrap="square" rtlCol="0">
+              <a:spAutoFit/>
+            </a:bodyPr>
+            <a:lstStyle/>
+            <a:p>
+              <a:pPr algn="r"/>
+              <a:r>
+                <a:rPr lang="fr-FR" sz="1100" dirty="0">
+                  <a:latin typeface="Arial" panose="020B0604020202020204" pitchFamily="34" charset="0"/>
+                  <a:cs typeface="Arial" panose="020B0604020202020204" pitchFamily="34" charset="0"/>
+                </a:rPr>
+                <a:t>6x10</a:t>
+              </a:r>
+              <a:r>
+                <a:rPr lang="fr-FR" sz="1100" baseline="30000" dirty="0">
+                  <a:latin typeface="Arial" panose="020B0604020202020204" pitchFamily="34" charset="0"/>
+                  <a:cs typeface="Arial" panose="020B0604020202020204" pitchFamily="34" charset="0"/>
+                </a:rPr>
+                <a:t>-2</a:t>
+              </a:r>
+            </a:p>
+          </p:txBody>
+        </p:sp>
+        <p:sp>
+          <p:nvSpPr>
+            <p:cNvPr id="25" name="ZoneTexte 24">
+              <a:extLst>
+                <a:ext uri="{FF2B5EF4-FFF2-40B4-BE49-F238E27FC236}">
+                  <a16:creationId xmlns:a16="http://schemas.microsoft.com/office/drawing/2014/main" id="{C2BFD021-113B-0E4D-BD1D-89ED47DF253C}"/>
+                </a:ext>
+              </a:extLst>
+            </p:cNvPr>
+            <p:cNvSpPr txBox="1"/>
+            <p:nvPr/>
+          </p:nvSpPr>
+          <p:spPr>
+            <a:xfrm>
+              <a:off x="6011886" y="1706147"/>
+              <a:ext cx="613115" cy="261610"/>
+            </a:xfrm>
+            <a:prstGeom prst="rect">
+              <a:avLst/>
+            </a:prstGeom>
+            <a:noFill/>
+          </p:spPr>
+          <p:txBody>
+            <a:bodyPr wrap="square" rtlCol="0">
+              <a:spAutoFit/>
+            </a:bodyPr>
+            <a:lstStyle/>
+            <a:p>
+              <a:pPr algn="r"/>
+              <a:r>
+                <a:rPr lang="fr-FR" sz="1100" dirty="0">
+                  <a:latin typeface="Arial" panose="020B0604020202020204" pitchFamily="34" charset="0"/>
+                  <a:cs typeface="Arial" panose="020B0604020202020204" pitchFamily="34" charset="0"/>
+                </a:rPr>
+                <a:t>1x10</a:t>
+              </a:r>
+              <a:r>
+                <a:rPr lang="fr-FR" sz="1100" baseline="30000" dirty="0">
+                  <a:latin typeface="Arial" panose="020B0604020202020204" pitchFamily="34" charset="0"/>
+                  <a:cs typeface="Arial" panose="020B0604020202020204" pitchFamily="34" charset="0"/>
+                </a:rPr>
+                <a:t>-2</a:t>
+              </a:r>
+            </a:p>
+          </p:txBody>
+        </p:sp>
+        <p:sp>
+          <p:nvSpPr>
+            <p:cNvPr id="26" name="ZoneTexte 25">
+              <a:extLst>
+                <a:ext uri="{FF2B5EF4-FFF2-40B4-BE49-F238E27FC236}">
+                  <a16:creationId xmlns:a16="http://schemas.microsoft.com/office/drawing/2014/main" id="{2A98F633-8ED5-E944-AD6D-2B160DE2153F}"/>
+                </a:ext>
+              </a:extLst>
+            </p:cNvPr>
+            <p:cNvSpPr txBox="1"/>
+            <p:nvPr/>
+          </p:nvSpPr>
+          <p:spPr>
+            <a:xfrm>
+              <a:off x="9034448" y="1681694"/>
+              <a:ext cx="582318" cy="261610"/>
+            </a:xfrm>
+            <a:prstGeom prst="rect">
+              <a:avLst/>
+            </a:prstGeom>
+            <a:noFill/>
+          </p:spPr>
+          <p:txBody>
+            <a:bodyPr wrap="square" rtlCol="0">
+              <a:spAutoFit/>
+            </a:bodyPr>
+            <a:lstStyle/>
+            <a:p>
+              <a:pPr algn="r"/>
+              <a:r>
+                <a:rPr lang="fr-FR" sz="1100" dirty="0">
+                  <a:latin typeface="Arial" panose="020B0604020202020204" pitchFamily="34" charset="0"/>
+                  <a:cs typeface="Arial" panose="020B0604020202020204" pitchFamily="34" charset="0"/>
+                </a:rPr>
+                <a:t>2x10</a:t>
+              </a:r>
+              <a:r>
+                <a:rPr lang="fr-FR" sz="1100" baseline="30000" dirty="0">
+                  <a:latin typeface="Arial" panose="020B0604020202020204" pitchFamily="34" charset="0"/>
+                  <a:cs typeface="Arial" panose="020B0604020202020204" pitchFamily="34" charset="0"/>
+                </a:rPr>
+                <a:t>-3</a:t>
+              </a:r>
+            </a:p>
+          </p:txBody>
+        </p:sp>
+        <p:sp>
+          <p:nvSpPr>
+            <p:cNvPr id="31" name="ZoneTexte 30">
+              <a:extLst>
+                <a:ext uri="{FF2B5EF4-FFF2-40B4-BE49-F238E27FC236}">
+                  <a16:creationId xmlns:a16="http://schemas.microsoft.com/office/drawing/2014/main" id="{4172E715-0A59-604B-96EF-E64BD740E78F}"/>
+                </a:ext>
+              </a:extLst>
+            </p:cNvPr>
+            <p:cNvSpPr txBox="1"/>
+            <p:nvPr/>
+          </p:nvSpPr>
+          <p:spPr>
+            <a:xfrm>
+              <a:off x="610674" y="4203855"/>
+              <a:ext cx="2241385" cy="369332"/>
+            </a:xfrm>
+            <a:prstGeom prst="rect">
+              <a:avLst/>
+            </a:prstGeom>
+            <a:noFill/>
+          </p:spPr>
+          <p:txBody>
+            <a:bodyPr wrap="square" rtlCol="0">
+              <a:spAutoFit/>
+            </a:bodyPr>
+            <a:lstStyle/>
+            <a:p>
+              <a:pPr algn="ctr"/>
+              <a:r>
+                <a:rPr lang="fr-FR" dirty="0"/>
+                <a:t>10</a:t>
+              </a:r>
+            </a:p>
+          </p:txBody>
+        </p:sp>
+        <p:sp>
+          <p:nvSpPr>
+            <p:cNvPr id="32" name="ZoneTexte 31">
+              <a:extLst>
+                <a:ext uri="{FF2B5EF4-FFF2-40B4-BE49-F238E27FC236}">
+                  <a16:creationId xmlns:a16="http://schemas.microsoft.com/office/drawing/2014/main" id="{1AD2695B-0857-9F4D-8256-63B6CB2B256B}"/>
+                </a:ext>
+              </a:extLst>
+            </p:cNvPr>
+            <p:cNvSpPr txBox="1"/>
+            <p:nvPr/>
+          </p:nvSpPr>
+          <p:spPr>
+            <a:xfrm>
+              <a:off x="3596940" y="4203855"/>
+              <a:ext cx="2241385" cy="369332"/>
+            </a:xfrm>
+            <a:prstGeom prst="rect">
+              <a:avLst/>
+            </a:prstGeom>
+            <a:noFill/>
+          </p:spPr>
+          <p:txBody>
+            <a:bodyPr wrap="square" rtlCol="0">
+              <a:spAutoFit/>
+            </a:bodyPr>
+            <a:lstStyle/>
+            <a:p>
+              <a:pPr algn="ctr"/>
+              <a:r>
+                <a:rPr lang="fr-FR" dirty="0"/>
+                <a:t>10</a:t>
+              </a:r>
+              <a:r>
+                <a:rPr lang="fr-FR" baseline="30000" dirty="0"/>
+                <a:t>2</a:t>
+              </a:r>
+            </a:p>
+          </p:txBody>
+        </p:sp>
+        <p:sp>
+          <p:nvSpPr>
+            <p:cNvPr id="33" name="ZoneTexte 32">
+              <a:extLst>
+                <a:ext uri="{FF2B5EF4-FFF2-40B4-BE49-F238E27FC236}">
+                  <a16:creationId xmlns:a16="http://schemas.microsoft.com/office/drawing/2014/main" id="{2A102DBA-01C3-9C49-9FBE-2A8C5C72EA3A}"/>
+                </a:ext>
+              </a:extLst>
+            </p:cNvPr>
+            <p:cNvSpPr txBox="1"/>
+            <p:nvPr/>
+          </p:nvSpPr>
+          <p:spPr>
+            <a:xfrm>
+              <a:off x="6573217" y="4203855"/>
+              <a:ext cx="2241385" cy="369332"/>
+            </a:xfrm>
+            <a:prstGeom prst="rect">
+              <a:avLst/>
+            </a:prstGeom>
+            <a:noFill/>
+          </p:spPr>
+          <p:txBody>
+            <a:bodyPr wrap="square" rtlCol="0">
+              <a:spAutoFit/>
+            </a:bodyPr>
+            <a:lstStyle/>
+            <a:p>
+              <a:pPr algn="ctr"/>
+              <a:r>
+                <a:rPr lang="fr-FR" dirty="0"/>
+                <a:t>10</a:t>
+              </a:r>
+              <a:r>
+                <a:rPr lang="fr-FR" baseline="30000" dirty="0"/>
+                <a:t>3</a:t>
+              </a:r>
+            </a:p>
+          </p:txBody>
+        </p:sp>
+        <p:sp>
+          <p:nvSpPr>
+            <p:cNvPr id="34" name="ZoneTexte 33">
+              <a:extLst>
+                <a:ext uri="{FF2B5EF4-FFF2-40B4-BE49-F238E27FC236}">
+                  <a16:creationId xmlns:a16="http://schemas.microsoft.com/office/drawing/2014/main" id="{EC7502D1-2943-4D4C-998B-6CD0B5F3F052}"/>
+                </a:ext>
+              </a:extLst>
+            </p:cNvPr>
+            <p:cNvSpPr txBox="1"/>
+            <p:nvPr/>
+          </p:nvSpPr>
+          <p:spPr>
+            <a:xfrm>
+              <a:off x="9569470" y="4203855"/>
+              <a:ext cx="2241385" cy="369332"/>
+            </a:xfrm>
+            <a:prstGeom prst="rect">
+              <a:avLst/>
+            </a:prstGeom>
+            <a:noFill/>
+          </p:spPr>
+          <p:txBody>
+            <a:bodyPr wrap="square" rtlCol="0">
+              <a:spAutoFit/>
+            </a:bodyPr>
+            <a:lstStyle/>
+            <a:p>
+              <a:pPr algn="ctr"/>
+              <a:r>
+                <a:rPr lang="fr-FR" dirty="0"/>
+                <a:t>10</a:t>
+              </a:r>
+              <a:r>
+                <a:rPr lang="fr-FR" baseline="30000" dirty="0"/>
+                <a:t>4</a:t>
+              </a:r>
+            </a:p>
+          </p:txBody>
+        </p:sp>
+        <p:pic>
+          <p:nvPicPr>
+            <p:cNvPr id="27" name="Image 26">
+              <a:extLst>
+                <a:ext uri="{FF2B5EF4-FFF2-40B4-BE49-F238E27FC236}">
+                  <a16:creationId xmlns:a16="http://schemas.microsoft.com/office/drawing/2014/main" id="{C9D29867-2993-114F-9268-696B623DA6C4}"/>
+                </a:ext>
+              </a:extLst>
+            </p:cNvPr>
+            <p:cNvPicPr>
+              <a:picLocks noChangeAspect="1"/>
+            </p:cNvPicPr>
+            <p:nvPr/>
+          </p:nvPicPr>
+          <p:blipFill rotWithShape="1">
+            <a:blip r:embed="rId5"/>
+            <a:srcRect l="21282" t="7778" r="17693" b="10855"/>
+            <a:stretch/>
+          </p:blipFill>
+          <p:spPr>
+            <a:xfrm>
+              <a:off x="622756" y="1951205"/>
+              <a:ext cx="2239200" cy="2239200"/>
+            </a:xfrm>
+            <a:prstGeom prst="rect">
+              <a:avLst/>
+            </a:prstGeom>
+            <a:ln>
+              <a:solidFill>
+                <a:schemeClr val="tx1"/>
+              </a:solidFill>
+            </a:ln>
+          </p:spPr>
+        </p:pic>
+        <p:pic>
+          <p:nvPicPr>
+            <p:cNvPr id="35" name="Image 34">
+              <a:extLst>
+                <a:ext uri="{FF2B5EF4-FFF2-40B4-BE49-F238E27FC236}">
+                  <a16:creationId xmlns:a16="http://schemas.microsoft.com/office/drawing/2014/main" id="{3BDB2B85-3F74-794B-B09D-811A7F48B314}"/>
+                </a:ext>
+              </a:extLst>
+            </p:cNvPr>
+            <p:cNvPicPr>
+              <a:picLocks noChangeAspect="1"/>
+            </p:cNvPicPr>
+            <p:nvPr/>
+          </p:nvPicPr>
+          <p:blipFill rotWithShape="1">
+            <a:blip r:embed="rId6"/>
+            <a:srcRect l="21282" t="7778" r="17693" b="10855"/>
+            <a:stretch/>
+          </p:blipFill>
+          <p:spPr>
+            <a:xfrm>
+              <a:off x="3613072" y="1951205"/>
+              <a:ext cx="2239200" cy="2239200"/>
+            </a:xfrm>
+            <a:prstGeom prst="rect">
+              <a:avLst/>
+            </a:prstGeom>
+            <a:ln>
+              <a:solidFill>
+                <a:schemeClr val="tx1"/>
+              </a:solidFill>
+            </a:ln>
+          </p:spPr>
+        </p:pic>
+        <p:pic>
+          <p:nvPicPr>
+            <p:cNvPr id="36" name="Image 35">
+              <a:extLst>
+                <a:ext uri="{FF2B5EF4-FFF2-40B4-BE49-F238E27FC236}">
+                  <a16:creationId xmlns:a16="http://schemas.microsoft.com/office/drawing/2014/main" id="{608687B2-F1C9-DB4C-A0A6-CF540A79E920}"/>
+                </a:ext>
+              </a:extLst>
+            </p:cNvPr>
+            <p:cNvPicPr>
+              <a:picLocks noChangeAspect="1"/>
+            </p:cNvPicPr>
+            <p:nvPr/>
+          </p:nvPicPr>
+          <p:blipFill rotWithShape="1">
+            <a:blip r:embed="rId7"/>
+            <a:srcRect l="21282" t="7778" r="17693" b="10855"/>
+            <a:stretch/>
+          </p:blipFill>
+          <p:spPr>
+            <a:xfrm>
+              <a:off x="6592363" y="1951205"/>
+              <a:ext cx="2239200" cy="2239200"/>
+            </a:xfrm>
+            <a:prstGeom prst="rect">
+              <a:avLst/>
+            </a:prstGeom>
+            <a:ln>
+              <a:solidFill>
+                <a:schemeClr val="tx1"/>
+              </a:solidFill>
+            </a:ln>
+          </p:spPr>
+        </p:pic>
+        <p:pic>
+          <p:nvPicPr>
+            <p:cNvPr id="37" name="Image 36">
+              <a:extLst>
+                <a:ext uri="{FF2B5EF4-FFF2-40B4-BE49-F238E27FC236}">
+                  <a16:creationId xmlns:a16="http://schemas.microsoft.com/office/drawing/2014/main" id="{75F0AA04-DA4F-4247-9959-14951DAAE25D}"/>
+                </a:ext>
+              </a:extLst>
+            </p:cNvPr>
+            <p:cNvPicPr>
+              <a:picLocks noChangeAspect="1"/>
+            </p:cNvPicPr>
+            <p:nvPr/>
+          </p:nvPicPr>
+          <p:blipFill rotWithShape="1">
+            <a:blip r:embed="rId8"/>
+            <a:srcRect l="21282" t="7777" r="17693" b="10856"/>
+            <a:stretch/>
+          </p:blipFill>
+          <p:spPr>
+            <a:xfrm>
+              <a:off x="9571655" y="1951205"/>
+              <a:ext cx="2239200" cy="2239200"/>
+            </a:xfrm>
+            <a:prstGeom prst="rect">
+              <a:avLst/>
+            </a:prstGeom>
+            <a:ln>
+              <a:solidFill>
+                <a:schemeClr val="tx1"/>
+              </a:solidFill>
+            </a:ln>
+          </p:spPr>
+        </p:pic>
+      </p:grpSp>
+    </p:spTree>
+    <p:extLst>
+      <p:ext uri="{BB962C8B-B14F-4D97-AF65-F5344CB8AC3E}">
+        <p14:creationId xmlns:p14="http://schemas.microsoft.com/office/powerpoint/2010/main" val="1206308785"/>
+      </p:ext>
+    </p:extLst>
+  </p:cSld>
+  <p:clrMapOvr>
+    <a:masterClrMapping/>
+  </p:clrMapOvr>
+</p:sld>
+</file>
+
+<file path=ppt/slides/slide11.xml><?xml version="1.0" encoding="utf-8"?>
+<p:sld xmlns:a="http://schemas.openxmlformats.org/drawingml/2006/main" xmlns:r="http://schemas.openxmlformats.org/officeDocument/2006/relationships" xmlns:p="http://schemas.openxmlformats.org/presentationml/2006/main">
+  <p:cSld>
+    <p:spTree>
+      <p:nvGrpSpPr>
+        <p:cNvPr id="1" name=""/>
+        <p:cNvGrpSpPr/>
+        <p:nvPr/>
+      </p:nvGrpSpPr>
+      <p:grpSpPr>
+        <a:xfrm>
+          <a:off x="0" y="0"/>
+          <a:ext cx="0" cy="0"/>
+          <a:chOff x="0" y="0"/>
+          <a:chExt cx="0" cy="0"/>
+        </a:xfrm>
+      </p:grpSpPr>
+      <p:grpSp>
+        <p:nvGrpSpPr>
+          <p:cNvPr id="58" name="Groupe 57">
+            <a:extLst>
+              <a:ext uri="{FF2B5EF4-FFF2-40B4-BE49-F238E27FC236}">
+                <a16:creationId xmlns:a16="http://schemas.microsoft.com/office/drawing/2014/main" id="{4F2B3B48-2498-D44B-9D7F-0C1866F44C10}"/>
+              </a:ext>
+            </a:extLst>
+          </p:cNvPr>
+          <p:cNvGrpSpPr/>
+          <p:nvPr/>
+        </p:nvGrpSpPr>
+        <p:grpSpPr>
+          <a:xfrm>
+            <a:off x="396185" y="1257324"/>
+            <a:ext cx="9600000" cy="3969332"/>
+            <a:chOff x="396185" y="1257324"/>
+            <a:chExt cx="9600000" cy="3969332"/>
+          </a:xfrm>
+        </p:grpSpPr>
+        <p:pic>
+          <p:nvPicPr>
+            <p:cNvPr id="53" name="Image 52">
+              <a:extLst>
+                <a:ext uri="{FF2B5EF4-FFF2-40B4-BE49-F238E27FC236}">
+                  <a16:creationId xmlns:a16="http://schemas.microsoft.com/office/drawing/2014/main" id="{638ACB4D-2758-CA48-839A-546DA285D5B8}"/>
+                </a:ext>
+              </a:extLst>
+            </p:cNvPr>
+            <p:cNvPicPr>
+              <a:picLocks noChangeAspect="1"/>
+            </p:cNvPicPr>
+            <p:nvPr/>
+          </p:nvPicPr>
+          <p:blipFill>
+            <a:blip r:embed="rId2"/>
+            <a:stretch>
+              <a:fillRect/>
+            </a:stretch>
+          </p:blipFill>
+          <p:spPr>
+            <a:xfrm>
+              <a:off x="5196185" y="1257324"/>
+              <a:ext cx="4800000" cy="3600000"/>
+            </a:xfrm>
+            <a:prstGeom prst="rect">
+              <a:avLst/>
+            </a:prstGeom>
+          </p:spPr>
+        </p:pic>
+        <p:pic>
+          <p:nvPicPr>
+            <p:cNvPr id="55" name="Image 54">
+              <a:extLst>
+                <a:ext uri="{FF2B5EF4-FFF2-40B4-BE49-F238E27FC236}">
+                  <a16:creationId xmlns:a16="http://schemas.microsoft.com/office/drawing/2014/main" id="{37ED5B14-444C-684B-AE79-6E3069749E05}"/>
+                </a:ext>
+              </a:extLst>
+            </p:cNvPr>
+            <p:cNvPicPr>
+              <a:picLocks noChangeAspect="1"/>
+            </p:cNvPicPr>
+            <p:nvPr/>
+          </p:nvPicPr>
+          <p:blipFill>
+            <a:blip r:embed="rId3"/>
+            <a:stretch>
+              <a:fillRect/>
+            </a:stretch>
+          </p:blipFill>
+          <p:spPr>
+            <a:xfrm>
+              <a:off x="396185" y="1257324"/>
+              <a:ext cx="4800000" cy="3600000"/>
+            </a:xfrm>
+            <a:prstGeom prst="rect">
+              <a:avLst/>
+            </a:prstGeom>
+          </p:spPr>
+        </p:pic>
+        <p:sp>
+          <p:nvSpPr>
+            <p:cNvPr id="56" name="ZoneTexte 55">
+              <a:extLst>
+                <a:ext uri="{FF2B5EF4-FFF2-40B4-BE49-F238E27FC236}">
+                  <a16:creationId xmlns:a16="http://schemas.microsoft.com/office/drawing/2014/main" id="{7C0228A4-AE7D-0543-9112-44D91DEB203A}"/>
+                </a:ext>
+              </a:extLst>
+            </p:cNvPr>
+            <p:cNvSpPr txBox="1"/>
+            <p:nvPr/>
+          </p:nvSpPr>
+          <p:spPr>
+            <a:xfrm>
+              <a:off x="396186" y="4857324"/>
+              <a:ext cx="4800000" cy="369332"/>
+            </a:xfrm>
+            <a:prstGeom prst="rect">
+              <a:avLst/>
+            </a:prstGeom>
+            <a:noFill/>
+          </p:spPr>
+          <p:txBody>
+            <a:bodyPr wrap="square" rtlCol="0">
+              <a:spAutoFit/>
+            </a:bodyPr>
+            <a:lstStyle/>
+            <a:p>
+              <a:pPr algn="ctr"/>
+              <a:r>
+                <a:rPr lang="fr-FR" i="1" dirty="0">
+                  <a:latin typeface="Arial" panose="020B0604020202020204" pitchFamily="34" charset="0"/>
+                  <a:cs typeface="Arial" panose="020B0604020202020204" pitchFamily="34" charset="0"/>
+                </a:rPr>
+                <a:t>(a) </a:t>
+              </a:r>
+              <a:r>
+                <a:rPr lang="fr-FR" b="1" dirty="0">
+                  <a:latin typeface="Arial" panose="020B0604020202020204" pitchFamily="34" charset="0"/>
+                  <a:cs typeface="Arial" panose="020B0604020202020204" pitchFamily="34" charset="0"/>
+                </a:rPr>
+                <a:t>J</a:t>
+              </a:r>
+            </a:p>
+          </p:txBody>
+        </p:sp>
+        <p:sp>
+          <p:nvSpPr>
+            <p:cNvPr id="57" name="ZoneTexte 56">
+              <a:extLst>
+                <a:ext uri="{FF2B5EF4-FFF2-40B4-BE49-F238E27FC236}">
+                  <a16:creationId xmlns:a16="http://schemas.microsoft.com/office/drawing/2014/main" id="{CF886D46-ACFF-2A43-B55F-2E2462F2593C}"/>
+                </a:ext>
+              </a:extLst>
+            </p:cNvPr>
+            <p:cNvSpPr txBox="1"/>
+            <p:nvPr/>
+          </p:nvSpPr>
+          <p:spPr>
+            <a:xfrm>
+              <a:off x="5196185" y="4857324"/>
+              <a:ext cx="4800000" cy="369332"/>
+            </a:xfrm>
+            <a:prstGeom prst="rect">
+              <a:avLst/>
+            </a:prstGeom>
+            <a:noFill/>
+          </p:spPr>
+          <p:txBody>
+            <a:bodyPr wrap="square" rtlCol="0">
+              <a:spAutoFit/>
+            </a:bodyPr>
+            <a:lstStyle/>
+            <a:p>
+              <a:pPr algn="ctr"/>
+              <a:r>
+                <a:rPr lang="fr-FR" i="1" dirty="0">
+                  <a:latin typeface="Arial" panose="020B0604020202020204" pitchFamily="34" charset="0"/>
+                  <a:cs typeface="Arial" panose="020B0604020202020204" pitchFamily="34" charset="0"/>
+                </a:rPr>
+                <a:t>(b) </a:t>
+              </a:r>
+              <a:r>
+                <a:rPr lang="fr-FR" b="1" dirty="0">
+                  <a:latin typeface="Arial" panose="020B0604020202020204" pitchFamily="34" charset="0"/>
+                  <a:cs typeface="Arial" panose="020B0604020202020204" pitchFamily="34" charset="0"/>
+                </a:rPr>
+                <a:t>L</a:t>
+              </a:r>
+            </a:p>
+          </p:txBody>
+        </p:sp>
+      </p:grpSp>
+      <p:sp>
+        <p:nvSpPr>
+          <p:cNvPr id="59" name="ZoneTexte 58">
+            <a:extLst>
+              <a:ext uri="{FF2B5EF4-FFF2-40B4-BE49-F238E27FC236}">
+                <a16:creationId xmlns:a16="http://schemas.microsoft.com/office/drawing/2014/main" id="{7F6A1479-09B0-1D42-A1BF-DBACC8EA7C1D}"/>
+              </a:ext>
+            </a:extLst>
+          </p:cNvPr>
+          <p:cNvSpPr txBox="1"/>
+          <p:nvPr/>
+        </p:nvSpPr>
+        <p:spPr>
+          <a:xfrm>
+            <a:off x="0" y="0"/>
+            <a:ext cx="3505200" cy="369332"/>
+          </a:xfrm>
+          <a:prstGeom prst="rect">
+            <a:avLst/>
+          </a:prstGeom>
+          <a:noFill/>
+        </p:spPr>
+        <p:txBody>
+          <a:bodyPr wrap="square" rtlCol="0">
+            <a:spAutoFit/>
+          </a:bodyPr>
+          <a:lstStyle/>
+          <a:p>
+            <a:r>
+              <a:rPr lang="fr-FR" dirty="0"/>
+              <a:t>membrane</a:t>
+            </a:r>
+          </a:p>
+        </p:txBody>
+      </p:sp>
     </p:spTree>
     <p:extLst>
       <p:ext uri="{BB962C8B-B14F-4D97-AF65-F5344CB8AC3E}">
         <p14:creationId xmlns:p14="http://schemas.microsoft.com/office/powerpoint/2010/main" val="2679626170"/>
+      </p:ext>
+    </p:extLst>
+  </p:cSld>
+  <p:clrMapOvr>
+    <a:masterClrMapping/>
+  </p:clrMapOvr>
+</p:sld>
+</file>
+
+<file path=ppt/slides/slide12.xml><?xml version="1.0" encoding="utf-8"?>
+<p:sld xmlns:a="http://schemas.openxmlformats.org/drawingml/2006/main" xmlns:r="http://schemas.openxmlformats.org/officeDocument/2006/relationships" xmlns:p="http://schemas.openxmlformats.org/presentationml/2006/main">
+  <p:cSld>
+    <p:spTree>
+      <p:nvGrpSpPr>
+        <p:cNvPr id="1" name=""/>
+        <p:cNvGrpSpPr/>
+        <p:nvPr/>
+      </p:nvGrpSpPr>
+      <p:grpSpPr>
+        <a:xfrm>
+          <a:off x="0" y="0"/>
+          <a:ext cx="0" cy="0"/>
+          <a:chOff x="0" y="0"/>
+          <a:chExt cx="0" cy="0"/>
+        </a:xfrm>
+      </p:grpSpPr>
+      <p:grpSp>
+        <p:nvGrpSpPr>
+          <p:cNvPr id="6" name="Groupe 5">
+            <a:extLst>
+              <a:ext uri="{FF2B5EF4-FFF2-40B4-BE49-F238E27FC236}">
+                <a16:creationId xmlns:a16="http://schemas.microsoft.com/office/drawing/2014/main" id="{1FB28803-1BD0-8D4E-9FE0-C29A1A60C5FE}"/>
+              </a:ext>
+            </a:extLst>
+          </p:cNvPr>
+          <p:cNvGrpSpPr/>
+          <p:nvPr/>
+        </p:nvGrpSpPr>
+        <p:grpSpPr>
+          <a:xfrm>
+            <a:off x="396185" y="1257324"/>
+            <a:ext cx="9600000" cy="3969332"/>
+            <a:chOff x="396185" y="1257324"/>
+            <a:chExt cx="9600000" cy="3969332"/>
+          </a:xfrm>
+        </p:grpSpPr>
+        <p:pic>
+          <p:nvPicPr>
+            <p:cNvPr id="53" name="Image 52">
+              <a:extLst>
+                <a:ext uri="{FF2B5EF4-FFF2-40B4-BE49-F238E27FC236}">
+                  <a16:creationId xmlns:a16="http://schemas.microsoft.com/office/drawing/2014/main" id="{638ACB4D-2758-CA48-839A-546DA285D5B8}"/>
+                </a:ext>
+              </a:extLst>
+            </p:cNvPr>
+            <p:cNvPicPr>
+              <a:picLocks noChangeAspect="1"/>
+            </p:cNvPicPr>
+            <p:nvPr/>
+          </p:nvPicPr>
+          <p:blipFill>
+            <a:blip r:embed="rId2"/>
+            <a:stretch>
+              <a:fillRect/>
+            </a:stretch>
+          </p:blipFill>
+          <p:spPr>
+            <a:xfrm>
+              <a:off x="5196185" y="1257324"/>
+              <a:ext cx="4800000" cy="3600000"/>
+            </a:xfrm>
+            <a:prstGeom prst="rect">
+              <a:avLst/>
+            </a:prstGeom>
+          </p:spPr>
+        </p:pic>
+        <p:pic>
+          <p:nvPicPr>
+            <p:cNvPr id="55" name="Image 54">
+              <a:extLst>
+                <a:ext uri="{FF2B5EF4-FFF2-40B4-BE49-F238E27FC236}">
+                  <a16:creationId xmlns:a16="http://schemas.microsoft.com/office/drawing/2014/main" id="{37ED5B14-444C-684B-AE79-6E3069749E05}"/>
+                </a:ext>
+              </a:extLst>
+            </p:cNvPr>
+            <p:cNvPicPr>
+              <a:picLocks noChangeAspect="1"/>
+            </p:cNvPicPr>
+            <p:nvPr/>
+          </p:nvPicPr>
+          <p:blipFill>
+            <a:blip r:embed="rId3"/>
+            <a:stretch>
+              <a:fillRect/>
+            </a:stretch>
+          </p:blipFill>
+          <p:spPr>
+            <a:xfrm>
+              <a:off x="396185" y="1257324"/>
+              <a:ext cx="4800000" cy="3600000"/>
+            </a:xfrm>
+            <a:prstGeom prst="rect">
+              <a:avLst/>
+            </a:prstGeom>
+          </p:spPr>
+        </p:pic>
+        <p:sp>
+          <p:nvSpPr>
+            <p:cNvPr id="56" name="ZoneTexte 55">
+              <a:extLst>
+                <a:ext uri="{FF2B5EF4-FFF2-40B4-BE49-F238E27FC236}">
+                  <a16:creationId xmlns:a16="http://schemas.microsoft.com/office/drawing/2014/main" id="{7C0228A4-AE7D-0543-9112-44D91DEB203A}"/>
+                </a:ext>
+              </a:extLst>
+            </p:cNvPr>
+            <p:cNvSpPr txBox="1"/>
+            <p:nvPr/>
+          </p:nvSpPr>
+          <p:spPr>
+            <a:xfrm>
+              <a:off x="396186" y="4857324"/>
+              <a:ext cx="4800000" cy="369332"/>
+            </a:xfrm>
+            <a:prstGeom prst="rect">
+              <a:avLst/>
+            </a:prstGeom>
+            <a:noFill/>
+          </p:spPr>
+          <p:txBody>
+            <a:bodyPr wrap="square" rtlCol="0">
+              <a:spAutoFit/>
+            </a:bodyPr>
+            <a:lstStyle/>
+            <a:p>
+              <a:pPr algn="ctr"/>
+              <a:r>
+                <a:rPr lang="fr-FR" i="1" dirty="0">
+                  <a:latin typeface="Arial" panose="020B0604020202020204" pitchFamily="34" charset="0"/>
+                  <a:cs typeface="Arial" panose="020B0604020202020204" pitchFamily="34" charset="0"/>
+                </a:rPr>
+                <a:t>(a) </a:t>
+              </a:r>
+              <a:r>
+                <a:rPr lang="fr-FR" b="1" dirty="0">
+                  <a:latin typeface="Arial" panose="020B0604020202020204" pitchFamily="34" charset="0"/>
+                  <a:cs typeface="Arial" panose="020B0604020202020204" pitchFamily="34" charset="0"/>
+                </a:rPr>
+                <a:t>H</a:t>
+              </a:r>
+            </a:p>
+          </p:txBody>
+        </p:sp>
+        <p:sp>
+          <p:nvSpPr>
+            <p:cNvPr id="57" name="ZoneTexte 56">
+              <a:extLst>
+                <a:ext uri="{FF2B5EF4-FFF2-40B4-BE49-F238E27FC236}">
+                  <a16:creationId xmlns:a16="http://schemas.microsoft.com/office/drawing/2014/main" id="{CF886D46-ACFF-2A43-B55F-2E2462F2593C}"/>
+                </a:ext>
+              </a:extLst>
+            </p:cNvPr>
+            <p:cNvSpPr txBox="1"/>
+            <p:nvPr/>
+          </p:nvSpPr>
+          <p:spPr>
+            <a:xfrm>
+              <a:off x="5196185" y="4857324"/>
+              <a:ext cx="4800000" cy="369332"/>
+            </a:xfrm>
+            <a:prstGeom prst="rect">
+              <a:avLst/>
+            </a:prstGeom>
+            <a:noFill/>
+          </p:spPr>
+          <p:txBody>
+            <a:bodyPr wrap="square" rtlCol="0">
+              <a:spAutoFit/>
+            </a:bodyPr>
+            <a:lstStyle/>
+            <a:p>
+              <a:pPr algn="ctr"/>
+              <a:r>
+                <a:rPr lang="fr-FR" i="1" dirty="0">
+                  <a:latin typeface="Arial" panose="020B0604020202020204" pitchFamily="34" charset="0"/>
+                  <a:cs typeface="Arial" panose="020B0604020202020204" pitchFamily="34" charset="0"/>
+                </a:rPr>
+                <a:t>(b) </a:t>
+              </a:r>
+              <a:r>
+                <a:rPr lang="fr-FR" b="1" dirty="0">
+                  <a:latin typeface="Arial" panose="020B0604020202020204" pitchFamily="34" charset="0"/>
+                  <a:cs typeface="Arial" panose="020B0604020202020204" pitchFamily="34" charset="0"/>
+                </a:rPr>
+                <a:t>L</a:t>
+              </a:r>
+            </a:p>
+          </p:txBody>
+        </p:sp>
+        <p:pic>
+          <p:nvPicPr>
+            <p:cNvPr id="3" name="Image 2">
+              <a:extLst>
+                <a:ext uri="{FF2B5EF4-FFF2-40B4-BE49-F238E27FC236}">
+                  <a16:creationId xmlns:a16="http://schemas.microsoft.com/office/drawing/2014/main" id="{92231F21-5942-F84E-84AF-0CAF96E67C6E}"/>
+                </a:ext>
+              </a:extLst>
+            </p:cNvPr>
+            <p:cNvPicPr>
+              <a:picLocks noChangeAspect="1"/>
+            </p:cNvPicPr>
+            <p:nvPr/>
+          </p:nvPicPr>
+          <p:blipFill>
+            <a:blip r:embed="rId4"/>
+            <a:stretch>
+              <a:fillRect/>
+            </a:stretch>
+          </p:blipFill>
+          <p:spPr>
+            <a:xfrm>
+              <a:off x="5196184" y="1257324"/>
+              <a:ext cx="4800000" cy="3600000"/>
+            </a:xfrm>
+            <a:prstGeom prst="rect">
+              <a:avLst/>
+            </a:prstGeom>
+          </p:spPr>
+        </p:pic>
+        <p:pic>
+          <p:nvPicPr>
+            <p:cNvPr id="5" name="Image 4">
+              <a:extLst>
+                <a:ext uri="{FF2B5EF4-FFF2-40B4-BE49-F238E27FC236}">
+                  <a16:creationId xmlns:a16="http://schemas.microsoft.com/office/drawing/2014/main" id="{753C9B4D-5BAE-0249-AB70-5A9936E23C9B}"/>
+                </a:ext>
+              </a:extLst>
+            </p:cNvPr>
+            <p:cNvPicPr>
+              <a:picLocks noChangeAspect="1"/>
+            </p:cNvPicPr>
+            <p:nvPr/>
+          </p:nvPicPr>
+          <p:blipFill>
+            <a:blip r:embed="rId5"/>
+            <a:stretch>
+              <a:fillRect/>
+            </a:stretch>
+          </p:blipFill>
+          <p:spPr>
+            <a:xfrm>
+              <a:off x="396185" y="1257324"/>
+              <a:ext cx="4800000" cy="3600000"/>
+            </a:xfrm>
+            <a:prstGeom prst="rect">
+              <a:avLst/>
+            </a:prstGeom>
+          </p:spPr>
+        </p:pic>
+      </p:grpSp>
+      <p:sp>
+        <p:nvSpPr>
+          <p:cNvPr id="12" name="ZoneTexte 11">
+            <a:extLst>
+              <a:ext uri="{FF2B5EF4-FFF2-40B4-BE49-F238E27FC236}">
+                <a16:creationId xmlns:a16="http://schemas.microsoft.com/office/drawing/2014/main" id="{6227B962-3613-1D4A-9656-A7F6FAFCE24C}"/>
+              </a:ext>
+            </a:extLst>
+          </p:cNvPr>
+          <p:cNvSpPr txBox="1"/>
+          <p:nvPr/>
+        </p:nvSpPr>
+        <p:spPr>
+          <a:xfrm>
+            <a:off x="0" y="0"/>
+            <a:ext cx="3505200" cy="369332"/>
+          </a:xfrm>
+          <a:prstGeom prst="rect">
+            <a:avLst/>
+          </a:prstGeom>
+          <a:noFill/>
+        </p:spPr>
+        <p:txBody>
+          <a:bodyPr wrap="square" rtlCol="0">
+            <a:spAutoFit/>
+          </a:bodyPr>
+          <a:lstStyle/>
+          <a:p>
+            <a:r>
+              <a:rPr lang="fr-FR" dirty="0" err="1"/>
+              <a:t>bending</a:t>
+            </a:r>
+            <a:endParaRPr lang="fr-FR" dirty="0"/>
+          </a:p>
+        </p:txBody>
+      </p:sp>
+    </p:spTree>
+    <p:extLst>
+      <p:ext uri="{BB962C8B-B14F-4D97-AF65-F5344CB8AC3E}">
+        <p14:creationId xmlns:p14="http://schemas.microsoft.com/office/powerpoint/2010/main" val="3545663119"/>
+      </p:ext>
+    </p:extLst>
+  </p:cSld>
+  <p:clrMapOvr>
+    <a:masterClrMapping/>
+  </p:clrMapOvr>
+</p:sld>
+</file>
+
+<file path=ppt/slides/slide13.xml><?xml version="1.0" encoding="utf-8"?>
+<p:sld xmlns:a="http://schemas.openxmlformats.org/drawingml/2006/main" xmlns:r="http://schemas.openxmlformats.org/officeDocument/2006/relationships" xmlns:p="http://schemas.openxmlformats.org/presentationml/2006/main">
+  <p:cSld>
+    <p:spTree>
+      <p:nvGrpSpPr>
+        <p:cNvPr id="1" name=""/>
+        <p:cNvGrpSpPr/>
+        <p:nvPr/>
+      </p:nvGrpSpPr>
+      <p:grpSpPr>
+        <a:xfrm>
+          <a:off x="0" y="0"/>
+          <a:ext cx="0" cy="0"/>
+          <a:chOff x="0" y="0"/>
+          <a:chExt cx="0" cy="0"/>
+        </a:xfrm>
+      </p:grpSpPr>
+      <p:grpSp>
+        <p:nvGrpSpPr>
+          <p:cNvPr id="12" name="Groupe 11">
+            <a:extLst>
+              <a:ext uri="{FF2B5EF4-FFF2-40B4-BE49-F238E27FC236}">
+                <a16:creationId xmlns:a16="http://schemas.microsoft.com/office/drawing/2014/main" id="{8FDD14B4-83EA-A84D-88E8-19ED53BC22DC}"/>
+              </a:ext>
+            </a:extLst>
+          </p:cNvPr>
+          <p:cNvGrpSpPr/>
+          <p:nvPr/>
+        </p:nvGrpSpPr>
+        <p:grpSpPr>
+          <a:xfrm>
+            <a:off x="396182" y="1257324"/>
+            <a:ext cx="9600003" cy="3969332"/>
+            <a:chOff x="396182" y="1257324"/>
+            <a:chExt cx="9600003" cy="3969332"/>
+          </a:xfrm>
+        </p:grpSpPr>
+        <p:pic>
+          <p:nvPicPr>
+            <p:cNvPr id="53" name="Image 52">
+              <a:extLst>
+                <a:ext uri="{FF2B5EF4-FFF2-40B4-BE49-F238E27FC236}">
+                  <a16:creationId xmlns:a16="http://schemas.microsoft.com/office/drawing/2014/main" id="{638ACB4D-2758-CA48-839A-546DA285D5B8}"/>
+                </a:ext>
+              </a:extLst>
+            </p:cNvPr>
+            <p:cNvPicPr>
+              <a:picLocks noChangeAspect="1"/>
+            </p:cNvPicPr>
+            <p:nvPr/>
+          </p:nvPicPr>
+          <p:blipFill>
+            <a:blip r:embed="rId2"/>
+            <a:stretch>
+              <a:fillRect/>
+            </a:stretch>
+          </p:blipFill>
+          <p:spPr>
+            <a:xfrm>
+              <a:off x="5196185" y="1257324"/>
+              <a:ext cx="4800000" cy="3600000"/>
+            </a:xfrm>
+            <a:prstGeom prst="rect">
+              <a:avLst/>
+            </a:prstGeom>
+          </p:spPr>
+        </p:pic>
+        <p:pic>
+          <p:nvPicPr>
+            <p:cNvPr id="55" name="Image 54">
+              <a:extLst>
+                <a:ext uri="{FF2B5EF4-FFF2-40B4-BE49-F238E27FC236}">
+                  <a16:creationId xmlns:a16="http://schemas.microsoft.com/office/drawing/2014/main" id="{37ED5B14-444C-684B-AE79-6E3069749E05}"/>
+                </a:ext>
+              </a:extLst>
+            </p:cNvPr>
+            <p:cNvPicPr>
+              <a:picLocks noChangeAspect="1"/>
+            </p:cNvPicPr>
+            <p:nvPr/>
+          </p:nvPicPr>
+          <p:blipFill>
+            <a:blip r:embed="rId3"/>
+            <a:stretch>
+              <a:fillRect/>
+            </a:stretch>
+          </p:blipFill>
+          <p:spPr>
+            <a:xfrm>
+              <a:off x="396185" y="1257324"/>
+              <a:ext cx="4800000" cy="3600000"/>
+            </a:xfrm>
+            <a:prstGeom prst="rect">
+              <a:avLst/>
+            </a:prstGeom>
+          </p:spPr>
+        </p:pic>
+        <p:sp>
+          <p:nvSpPr>
+            <p:cNvPr id="56" name="ZoneTexte 55">
+              <a:extLst>
+                <a:ext uri="{FF2B5EF4-FFF2-40B4-BE49-F238E27FC236}">
+                  <a16:creationId xmlns:a16="http://schemas.microsoft.com/office/drawing/2014/main" id="{7C0228A4-AE7D-0543-9112-44D91DEB203A}"/>
+                </a:ext>
+              </a:extLst>
+            </p:cNvPr>
+            <p:cNvSpPr txBox="1"/>
+            <p:nvPr/>
+          </p:nvSpPr>
+          <p:spPr>
+            <a:xfrm>
+              <a:off x="396186" y="4857324"/>
+              <a:ext cx="4800000" cy="369332"/>
+            </a:xfrm>
+            <a:prstGeom prst="rect">
+              <a:avLst/>
+            </a:prstGeom>
+            <a:noFill/>
+          </p:spPr>
+          <p:txBody>
+            <a:bodyPr wrap="square" rtlCol="0">
+              <a:spAutoFit/>
+            </a:bodyPr>
+            <a:lstStyle/>
+            <a:p>
+              <a:pPr algn="ctr"/>
+              <a:r>
+                <a:rPr lang="fr-FR" i="1" dirty="0">
+                  <a:latin typeface="Arial" panose="020B0604020202020204" pitchFamily="34" charset="0"/>
+                  <a:cs typeface="Arial" panose="020B0604020202020204" pitchFamily="34" charset="0"/>
+                </a:rPr>
+                <a:t>(a) </a:t>
+              </a:r>
+              <a:r>
+                <a:rPr lang="fr-FR" b="1" dirty="0">
+                  <a:latin typeface="Arial" panose="020B0604020202020204" pitchFamily="34" charset="0"/>
+                  <a:cs typeface="Arial" panose="020B0604020202020204" pitchFamily="34" charset="0"/>
+                </a:rPr>
+                <a:t>S</a:t>
+              </a:r>
+            </a:p>
+          </p:txBody>
+        </p:sp>
+        <p:sp>
+          <p:nvSpPr>
+            <p:cNvPr id="57" name="ZoneTexte 56">
+              <a:extLst>
+                <a:ext uri="{FF2B5EF4-FFF2-40B4-BE49-F238E27FC236}">
+                  <a16:creationId xmlns:a16="http://schemas.microsoft.com/office/drawing/2014/main" id="{CF886D46-ACFF-2A43-B55F-2E2462F2593C}"/>
+                </a:ext>
+              </a:extLst>
+            </p:cNvPr>
+            <p:cNvSpPr txBox="1"/>
+            <p:nvPr/>
+          </p:nvSpPr>
+          <p:spPr>
+            <a:xfrm>
+              <a:off x="5196185" y="4857324"/>
+              <a:ext cx="4800000" cy="369332"/>
+            </a:xfrm>
+            <a:prstGeom prst="rect">
+              <a:avLst/>
+            </a:prstGeom>
+            <a:noFill/>
+          </p:spPr>
+          <p:txBody>
+            <a:bodyPr wrap="square" rtlCol="0">
+              <a:spAutoFit/>
+            </a:bodyPr>
+            <a:lstStyle/>
+            <a:p>
+              <a:pPr algn="ctr"/>
+              <a:r>
+                <a:rPr lang="fr-FR" i="1" dirty="0">
+                  <a:latin typeface="Arial" panose="020B0604020202020204" pitchFamily="34" charset="0"/>
+                  <a:cs typeface="Arial" panose="020B0604020202020204" pitchFamily="34" charset="0"/>
+                </a:rPr>
+                <a:t>(b) </a:t>
+              </a:r>
+              <a:r>
+                <a:rPr lang="fr-FR" b="1" dirty="0">
+                  <a:latin typeface="Arial" panose="020B0604020202020204" pitchFamily="34" charset="0"/>
+                  <a:cs typeface="Arial" panose="020B0604020202020204" pitchFamily="34" charset="0"/>
+                </a:rPr>
+                <a:t>L</a:t>
+              </a:r>
+            </a:p>
+          </p:txBody>
+        </p:sp>
+        <p:pic>
+          <p:nvPicPr>
+            <p:cNvPr id="3" name="Image 2">
+              <a:extLst>
+                <a:ext uri="{FF2B5EF4-FFF2-40B4-BE49-F238E27FC236}">
+                  <a16:creationId xmlns:a16="http://schemas.microsoft.com/office/drawing/2014/main" id="{92231F21-5942-F84E-84AF-0CAF96E67C6E}"/>
+                </a:ext>
+              </a:extLst>
+            </p:cNvPr>
+            <p:cNvPicPr>
+              <a:picLocks noChangeAspect="1"/>
+            </p:cNvPicPr>
+            <p:nvPr/>
+          </p:nvPicPr>
+          <p:blipFill>
+            <a:blip r:embed="rId4"/>
+            <a:stretch>
+              <a:fillRect/>
+            </a:stretch>
+          </p:blipFill>
+          <p:spPr>
+            <a:xfrm>
+              <a:off x="5196184" y="1257324"/>
+              <a:ext cx="4800000" cy="3600000"/>
+            </a:xfrm>
+            <a:prstGeom prst="rect">
+              <a:avLst/>
+            </a:prstGeom>
+          </p:spPr>
+        </p:pic>
+        <p:pic>
+          <p:nvPicPr>
+            <p:cNvPr id="5" name="Image 4">
+              <a:extLst>
+                <a:ext uri="{FF2B5EF4-FFF2-40B4-BE49-F238E27FC236}">
+                  <a16:creationId xmlns:a16="http://schemas.microsoft.com/office/drawing/2014/main" id="{753C9B4D-5BAE-0249-AB70-5A9936E23C9B}"/>
+                </a:ext>
+              </a:extLst>
+            </p:cNvPr>
+            <p:cNvPicPr>
+              <a:picLocks noChangeAspect="1"/>
+            </p:cNvPicPr>
+            <p:nvPr/>
+          </p:nvPicPr>
+          <p:blipFill>
+            <a:blip r:embed="rId5"/>
+            <a:stretch>
+              <a:fillRect/>
+            </a:stretch>
+          </p:blipFill>
+          <p:spPr>
+            <a:xfrm>
+              <a:off x="396185" y="1257324"/>
+              <a:ext cx="4800000" cy="3600000"/>
+            </a:xfrm>
+            <a:prstGeom prst="rect">
+              <a:avLst/>
+            </a:prstGeom>
+          </p:spPr>
+        </p:pic>
+        <p:pic>
+          <p:nvPicPr>
+            <p:cNvPr id="8" name="Image 7">
+              <a:extLst>
+                <a:ext uri="{FF2B5EF4-FFF2-40B4-BE49-F238E27FC236}">
+                  <a16:creationId xmlns:a16="http://schemas.microsoft.com/office/drawing/2014/main" id="{D65553AC-1AA5-2F49-B2AC-49E9D920A392}"/>
+                </a:ext>
+              </a:extLst>
+            </p:cNvPr>
+            <p:cNvPicPr>
+              <a:picLocks noChangeAspect="1"/>
+            </p:cNvPicPr>
+            <p:nvPr/>
+          </p:nvPicPr>
+          <p:blipFill>
+            <a:blip r:embed="rId6"/>
+            <a:stretch>
+              <a:fillRect/>
+            </a:stretch>
+          </p:blipFill>
+          <p:spPr>
+            <a:xfrm>
+              <a:off x="396182" y="1257324"/>
+              <a:ext cx="4800000" cy="3600000"/>
+            </a:xfrm>
+            <a:prstGeom prst="rect">
+              <a:avLst/>
+            </a:prstGeom>
+          </p:spPr>
+        </p:pic>
+        <p:pic>
+          <p:nvPicPr>
+            <p:cNvPr id="11" name="Image 10">
+              <a:extLst>
+                <a:ext uri="{FF2B5EF4-FFF2-40B4-BE49-F238E27FC236}">
+                  <a16:creationId xmlns:a16="http://schemas.microsoft.com/office/drawing/2014/main" id="{AE221BCF-CC72-244D-BB26-06D2BCAA7317}"/>
+                </a:ext>
+              </a:extLst>
+            </p:cNvPr>
+            <p:cNvPicPr>
+              <a:picLocks noChangeAspect="1"/>
+            </p:cNvPicPr>
+            <p:nvPr/>
+          </p:nvPicPr>
+          <p:blipFill>
+            <a:blip r:embed="rId7"/>
+            <a:stretch>
+              <a:fillRect/>
+            </a:stretch>
+          </p:blipFill>
+          <p:spPr>
+            <a:xfrm>
+              <a:off x="5196184" y="1257324"/>
+              <a:ext cx="4800000" cy="3600000"/>
+            </a:xfrm>
+            <a:prstGeom prst="rect">
+              <a:avLst/>
+            </a:prstGeom>
+          </p:spPr>
+        </p:pic>
+      </p:grpSp>
+      <p:sp>
+        <p:nvSpPr>
+          <p:cNvPr id="17" name="ZoneTexte 16">
+            <a:extLst>
+              <a:ext uri="{FF2B5EF4-FFF2-40B4-BE49-F238E27FC236}">
+                <a16:creationId xmlns:a16="http://schemas.microsoft.com/office/drawing/2014/main" id="{006705E3-65F1-F84C-BD6D-80F5056695FB}"/>
+              </a:ext>
+            </a:extLst>
+          </p:cNvPr>
+          <p:cNvSpPr txBox="1"/>
+          <p:nvPr/>
+        </p:nvSpPr>
+        <p:spPr>
+          <a:xfrm>
+            <a:off x="0" y="0"/>
+            <a:ext cx="3505200" cy="369332"/>
+          </a:xfrm>
+          <a:prstGeom prst="rect">
+            <a:avLst/>
+          </a:prstGeom>
+          <a:noFill/>
+        </p:spPr>
+        <p:txBody>
+          <a:bodyPr wrap="square" rtlCol="0">
+            <a:spAutoFit/>
+          </a:bodyPr>
+          <a:lstStyle/>
+          <a:p>
+            <a:r>
+              <a:rPr lang="fr-FR" dirty="0" err="1"/>
+              <a:t>shears</a:t>
+            </a:r>
+            <a:endParaRPr lang="fr-FR" dirty="0"/>
+          </a:p>
+        </p:txBody>
+      </p:sp>
+    </p:spTree>
+    <p:extLst>
+      <p:ext uri="{BB962C8B-B14F-4D97-AF65-F5344CB8AC3E}">
+        <p14:creationId xmlns:p14="http://schemas.microsoft.com/office/powerpoint/2010/main" val="2353994055"/>
+      </p:ext>
+    </p:extLst>
+  </p:cSld>
+  <p:clrMapOvr>
+    <a:masterClrMapping/>
+  </p:clrMapOvr>
+</p:sld>
+</file>
+
+<file path=ppt/slides/slide14.xml><?xml version="1.0" encoding="utf-8"?>
+<p:sld xmlns:a="http://schemas.openxmlformats.org/drawingml/2006/main" xmlns:r="http://schemas.openxmlformats.org/officeDocument/2006/relationships" xmlns:p="http://schemas.openxmlformats.org/presentationml/2006/main">
+  <p:cSld>
+    <p:spTree>
+      <p:nvGrpSpPr>
+        <p:cNvPr id="1" name=""/>
+        <p:cNvGrpSpPr/>
+        <p:nvPr/>
+      </p:nvGrpSpPr>
+      <p:grpSpPr>
+        <a:xfrm>
+          <a:off x="0" y="0"/>
+          <a:ext cx="0" cy="0"/>
+          <a:chOff x="0" y="0"/>
+          <a:chExt cx="0" cy="0"/>
+        </a:xfrm>
+      </p:grpSpPr>
+      <p:sp>
+        <p:nvSpPr>
+          <p:cNvPr id="17" name="ZoneTexte 16">
+            <a:extLst>
+              <a:ext uri="{FF2B5EF4-FFF2-40B4-BE49-F238E27FC236}">
+                <a16:creationId xmlns:a16="http://schemas.microsoft.com/office/drawing/2014/main" id="{006705E3-65F1-F84C-BD6D-80F5056695FB}"/>
+              </a:ext>
+            </a:extLst>
+          </p:cNvPr>
+          <p:cNvSpPr txBox="1"/>
+          <p:nvPr/>
+        </p:nvSpPr>
+        <p:spPr>
+          <a:xfrm>
+            <a:off x="0" y="0"/>
+            <a:ext cx="3505200" cy="369332"/>
+          </a:xfrm>
+          <a:prstGeom prst="rect">
+            <a:avLst/>
+          </a:prstGeom>
+          <a:noFill/>
+        </p:spPr>
+        <p:txBody>
+          <a:bodyPr wrap="square" rtlCol="0">
+            <a:spAutoFit/>
+          </a:bodyPr>
+          <a:lstStyle/>
+          <a:p>
+            <a:r>
+              <a:rPr lang="fr-FR" dirty="0"/>
+              <a:t>zooms</a:t>
+            </a:r>
+          </a:p>
+        </p:txBody>
+      </p:sp>
+      <p:grpSp>
+        <p:nvGrpSpPr>
+          <p:cNvPr id="18" name="Groupe 17">
+            <a:extLst>
+              <a:ext uri="{FF2B5EF4-FFF2-40B4-BE49-F238E27FC236}">
+                <a16:creationId xmlns:a16="http://schemas.microsoft.com/office/drawing/2014/main" id="{B2024DFD-6274-E742-A189-CD51F25FCEAB}"/>
+              </a:ext>
+            </a:extLst>
+          </p:cNvPr>
+          <p:cNvGrpSpPr/>
+          <p:nvPr/>
+        </p:nvGrpSpPr>
+        <p:grpSpPr>
+          <a:xfrm>
+            <a:off x="396180" y="1257324"/>
+            <a:ext cx="9600005" cy="3969332"/>
+            <a:chOff x="396180" y="1257324"/>
+            <a:chExt cx="9600005" cy="3969332"/>
+          </a:xfrm>
+        </p:grpSpPr>
+        <p:pic>
+          <p:nvPicPr>
+            <p:cNvPr id="53" name="Image 52">
+              <a:extLst>
+                <a:ext uri="{FF2B5EF4-FFF2-40B4-BE49-F238E27FC236}">
+                  <a16:creationId xmlns:a16="http://schemas.microsoft.com/office/drawing/2014/main" id="{638ACB4D-2758-CA48-839A-546DA285D5B8}"/>
+                </a:ext>
+              </a:extLst>
+            </p:cNvPr>
+            <p:cNvPicPr>
+              <a:picLocks noChangeAspect="1"/>
+            </p:cNvPicPr>
+            <p:nvPr/>
+          </p:nvPicPr>
+          <p:blipFill>
+            <a:blip r:embed="rId2"/>
+            <a:stretch>
+              <a:fillRect/>
+            </a:stretch>
+          </p:blipFill>
+          <p:spPr>
+            <a:xfrm>
+              <a:off x="5196185" y="1257324"/>
+              <a:ext cx="4800000" cy="3600000"/>
+            </a:xfrm>
+            <a:prstGeom prst="rect">
+              <a:avLst/>
+            </a:prstGeom>
+          </p:spPr>
+        </p:pic>
+        <p:pic>
+          <p:nvPicPr>
+            <p:cNvPr id="55" name="Image 54">
+              <a:extLst>
+                <a:ext uri="{FF2B5EF4-FFF2-40B4-BE49-F238E27FC236}">
+                  <a16:creationId xmlns:a16="http://schemas.microsoft.com/office/drawing/2014/main" id="{37ED5B14-444C-684B-AE79-6E3069749E05}"/>
+                </a:ext>
+              </a:extLst>
+            </p:cNvPr>
+            <p:cNvPicPr>
+              <a:picLocks noChangeAspect="1"/>
+            </p:cNvPicPr>
+            <p:nvPr/>
+          </p:nvPicPr>
+          <p:blipFill>
+            <a:blip r:embed="rId3"/>
+            <a:stretch>
+              <a:fillRect/>
+            </a:stretch>
+          </p:blipFill>
+          <p:spPr>
+            <a:xfrm>
+              <a:off x="396185" y="1257324"/>
+              <a:ext cx="4800000" cy="3600000"/>
+            </a:xfrm>
+            <a:prstGeom prst="rect">
+              <a:avLst/>
+            </a:prstGeom>
+          </p:spPr>
+        </p:pic>
+        <p:sp>
+          <p:nvSpPr>
+            <p:cNvPr id="56" name="ZoneTexte 55">
+              <a:extLst>
+                <a:ext uri="{FF2B5EF4-FFF2-40B4-BE49-F238E27FC236}">
+                  <a16:creationId xmlns:a16="http://schemas.microsoft.com/office/drawing/2014/main" id="{7C0228A4-AE7D-0543-9112-44D91DEB203A}"/>
+                </a:ext>
+              </a:extLst>
+            </p:cNvPr>
+            <p:cNvSpPr txBox="1"/>
+            <p:nvPr/>
+          </p:nvSpPr>
+          <p:spPr>
+            <a:xfrm>
+              <a:off x="396186" y="4857324"/>
+              <a:ext cx="4800000" cy="369332"/>
+            </a:xfrm>
+            <a:prstGeom prst="rect">
+              <a:avLst/>
+            </a:prstGeom>
+            <a:noFill/>
+          </p:spPr>
+          <p:txBody>
+            <a:bodyPr wrap="square" rtlCol="0">
+              <a:spAutoFit/>
+            </a:bodyPr>
+            <a:lstStyle/>
+            <a:p>
+              <a:pPr algn="ctr"/>
+              <a:r>
+                <a:rPr lang="fr-FR" i="1" dirty="0">
+                  <a:latin typeface="Arial" panose="020B0604020202020204" pitchFamily="34" charset="0"/>
+                  <a:cs typeface="Arial" panose="020B0604020202020204" pitchFamily="34" charset="0"/>
+                </a:rPr>
+                <a:t>(a) </a:t>
+              </a:r>
+              <a:r>
+                <a:rPr lang="fr-FR" b="1" dirty="0">
+                  <a:latin typeface="Arial" panose="020B0604020202020204" pitchFamily="34" charset="0"/>
+                  <a:cs typeface="Arial" panose="020B0604020202020204" pitchFamily="34" charset="0"/>
+                </a:rPr>
+                <a:t>D</a:t>
+              </a:r>
+            </a:p>
+          </p:txBody>
+        </p:sp>
+        <p:sp>
+          <p:nvSpPr>
+            <p:cNvPr id="57" name="ZoneTexte 56">
+              <a:extLst>
+                <a:ext uri="{FF2B5EF4-FFF2-40B4-BE49-F238E27FC236}">
+                  <a16:creationId xmlns:a16="http://schemas.microsoft.com/office/drawing/2014/main" id="{CF886D46-ACFF-2A43-B55F-2E2462F2593C}"/>
+                </a:ext>
+              </a:extLst>
+            </p:cNvPr>
+            <p:cNvSpPr txBox="1"/>
+            <p:nvPr/>
+          </p:nvSpPr>
+          <p:spPr>
+            <a:xfrm>
+              <a:off x="5196185" y="4857324"/>
+              <a:ext cx="4800000" cy="369332"/>
+            </a:xfrm>
+            <a:prstGeom prst="rect">
+              <a:avLst/>
+            </a:prstGeom>
+            <a:noFill/>
+          </p:spPr>
+          <p:txBody>
+            <a:bodyPr wrap="square" rtlCol="0">
+              <a:spAutoFit/>
+            </a:bodyPr>
+            <a:lstStyle/>
+            <a:p>
+              <a:pPr algn="ctr"/>
+              <a:r>
+                <a:rPr lang="fr-FR" i="1" dirty="0">
+                  <a:latin typeface="Arial" panose="020B0604020202020204" pitchFamily="34" charset="0"/>
+                  <a:cs typeface="Arial" panose="020B0604020202020204" pitchFamily="34" charset="0"/>
+                </a:rPr>
+                <a:t>(b) </a:t>
+              </a:r>
+              <a:r>
+                <a:rPr lang="fr-FR" b="1" dirty="0">
+                  <a:latin typeface="Arial" panose="020B0604020202020204" pitchFamily="34" charset="0"/>
+                  <a:cs typeface="Arial" panose="020B0604020202020204" pitchFamily="34" charset="0"/>
+                </a:rPr>
+                <a:t>L</a:t>
+              </a:r>
+            </a:p>
+          </p:txBody>
+        </p:sp>
+        <p:pic>
+          <p:nvPicPr>
+            <p:cNvPr id="3" name="Image 2">
+              <a:extLst>
+                <a:ext uri="{FF2B5EF4-FFF2-40B4-BE49-F238E27FC236}">
+                  <a16:creationId xmlns:a16="http://schemas.microsoft.com/office/drawing/2014/main" id="{92231F21-5942-F84E-84AF-0CAF96E67C6E}"/>
+                </a:ext>
+              </a:extLst>
+            </p:cNvPr>
+            <p:cNvPicPr>
+              <a:picLocks noChangeAspect="1"/>
+            </p:cNvPicPr>
+            <p:nvPr/>
+          </p:nvPicPr>
+          <p:blipFill>
+            <a:blip r:embed="rId4"/>
+            <a:stretch>
+              <a:fillRect/>
+            </a:stretch>
+          </p:blipFill>
+          <p:spPr>
+            <a:xfrm>
+              <a:off x="5196184" y="1257324"/>
+              <a:ext cx="4800000" cy="3600000"/>
+            </a:xfrm>
+            <a:prstGeom prst="rect">
+              <a:avLst/>
+            </a:prstGeom>
+          </p:spPr>
+        </p:pic>
+        <p:pic>
+          <p:nvPicPr>
+            <p:cNvPr id="5" name="Image 4">
+              <a:extLst>
+                <a:ext uri="{FF2B5EF4-FFF2-40B4-BE49-F238E27FC236}">
+                  <a16:creationId xmlns:a16="http://schemas.microsoft.com/office/drawing/2014/main" id="{753C9B4D-5BAE-0249-AB70-5A9936E23C9B}"/>
+                </a:ext>
+              </a:extLst>
+            </p:cNvPr>
+            <p:cNvPicPr>
+              <a:picLocks noChangeAspect="1"/>
+            </p:cNvPicPr>
+            <p:nvPr/>
+          </p:nvPicPr>
+          <p:blipFill>
+            <a:blip r:embed="rId5"/>
+            <a:stretch>
+              <a:fillRect/>
+            </a:stretch>
+          </p:blipFill>
+          <p:spPr>
+            <a:xfrm>
+              <a:off x="396185" y="1257324"/>
+              <a:ext cx="4800000" cy="3600000"/>
+            </a:xfrm>
+            <a:prstGeom prst="rect">
+              <a:avLst/>
+            </a:prstGeom>
+          </p:spPr>
+        </p:pic>
+        <p:pic>
+          <p:nvPicPr>
+            <p:cNvPr id="8" name="Image 7">
+              <a:extLst>
+                <a:ext uri="{FF2B5EF4-FFF2-40B4-BE49-F238E27FC236}">
+                  <a16:creationId xmlns:a16="http://schemas.microsoft.com/office/drawing/2014/main" id="{D65553AC-1AA5-2F49-B2AC-49E9D920A392}"/>
+                </a:ext>
+              </a:extLst>
+            </p:cNvPr>
+            <p:cNvPicPr>
+              <a:picLocks noChangeAspect="1"/>
+            </p:cNvPicPr>
+            <p:nvPr/>
+          </p:nvPicPr>
+          <p:blipFill>
+            <a:blip r:embed="rId6"/>
+            <a:stretch>
+              <a:fillRect/>
+            </a:stretch>
+          </p:blipFill>
+          <p:spPr>
+            <a:xfrm>
+              <a:off x="396182" y="1257324"/>
+              <a:ext cx="4800000" cy="3600000"/>
+            </a:xfrm>
+            <a:prstGeom prst="rect">
+              <a:avLst/>
+            </a:prstGeom>
+          </p:spPr>
+        </p:pic>
+        <p:pic>
+          <p:nvPicPr>
+            <p:cNvPr id="11" name="Image 10">
+              <a:extLst>
+                <a:ext uri="{FF2B5EF4-FFF2-40B4-BE49-F238E27FC236}">
+                  <a16:creationId xmlns:a16="http://schemas.microsoft.com/office/drawing/2014/main" id="{AE221BCF-CC72-244D-BB26-06D2BCAA7317}"/>
+                </a:ext>
+              </a:extLst>
+            </p:cNvPr>
+            <p:cNvPicPr>
+              <a:picLocks noChangeAspect="1"/>
+            </p:cNvPicPr>
+            <p:nvPr/>
+          </p:nvPicPr>
+          <p:blipFill>
+            <a:blip r:embed="rId7"/>
+            <a:stretch>
+              <a:fillRect/>
+            </a:stretch>
+          </p:blipFill>
+          <p:spPr>
+            <a:xfrm>
+              <a:off x="5196184" y="1257324"/>
+              <a:ext cx="4800000" cy="3600000"/>
+            </a:xfrm>
+            <a:prstGeom prst="rect">
+              <a:avLst/>
+            </a:prstGeom>
+          </p:spPr>
+        </p:pic>
+        <p:pic>
+          <p:nvPicPr>
+            <p:cNvPr id="14" name="Image 13">
+              <a:extLst>
+                <a:ext uri="{FF2B5EF4-FFF2-40B4-BE49-F238E27FC236}">
+                  <a16:creationId xmlns:a16="http://schemas.microsoft.com/office/drawing/2014/main" id="{1FD8717D-55FF-EB46-A15A-66D715F7CA9E}"/>
+                </a:ext>
+              </a:extLst>
+            </p:cNvPr>
+            <p:cNvPicPr>
+              <a:picLocks noChangeAspect="1"/>
+            </p:cNvPicPr>
+            <p:nvPr/>
+          </p:nvPicPr>
+          <p:blipFill>
+            <a:blip r:embed="rId8"/>
+            <a:stretch>
+              <a:fillRect/>
+            </a:stretch>
+          </p:blipFill>
+          <p:spPr>
+            <a:xfrm>
+              <a:off x="5196179" y="1257324"/>
+              <a:ext cx="4800000" cy="3600000"/>
+            </a:xfrm>
+            <a:prstGeom prst="rect">
+              <a:avLst/>
+            </a:prstGeom>
+          </p:spPr>
+        </p:pic>
+        <p:pic>
+          <p:nvPicPr>
+            <p:cNvPr id="16" name="Image 15">
+              <a:extLst>
+                <a:ext uri="{FF2B5EF4-FFF2-40B4-BE49-F238E27FC236}">
+                  <a16:creationId xmlns:a16="http://schemas.microsoft.com/office/drawing/2014/main" id="{AACD5F72-2DDF-1045-905D-BF7D9C277D54}"/>
+                </a:ext>
+              </a:extLst>
+            </p:cNvPr>
+            <p:cNvPicPr>
+              <a:picLocks noChangeAspect="1"/>
+            </p:cNvPicPr>
+            <p:nvPr/>
+          </p:nvPicPr>
+          <p:blipFill>
+            <a:blip r:embed="rId9"/>
+            <a:stretch>
+              <a:fillRect/>
+            </a:stretch>
+          </p:blipFill>
+          <p:spPr>
+            <a:xfrm>
+              <a:off x="396180" y="1257324"/>
+              <a:ext cx="4800000" cy="3600000"/>
+            </a:xfrm>
+            <a:prstGeom prst="rect">
+              <a:avLst/>
+            </a:prstGeom>
+          </p:spPr>
+        </p:pic>
+      </p:grpSp>
+    </p:spTree>
+    <p:extLst>
+      <p:ext uri="{BB962C8B-B14F-4D97-AF65-F5344CB8AC3E}">
+        <p14:creationId xmlns:p14="http://schemas.microsoft.com/office/powerpoint/2010/main" val="3639948378"/>
+      </p:ext>
+    </p:extLst>
+  </p:cSld>
+  <p:clrMapOvr>
+    <a:masterClrMapping/>
+  </p:clrMapOvr>
+</p:sld>
+</file>
+
+<file path=ppt/slides/slide15.xml><?xml version="1.0" encoding="utf-8"?>
+<p:sld xmlns:a="http://schemas.openxmlformats.org/drawingml/2006/main" xmlns:r="http://schemas.openxmlformats.org/officeDocument/2006/relationships" xmlns:p="http://schemas.openxmlformats.org/presentationml/2006/main">
+  <p:cSld>
+    <p:spTree>
+      <p:nvGrpSpPr>
+        <p:cNvPr id="1" name=""/>
+        <p:cNvGrpSpPr/>
+        <p:nvPr/>
+      </p:nvGrpSpPr>
+      <p:grpSpPr>
+        <a:xfrm>
+          <a:off x="0" y="0"/>
+          <a:ext cx="0" cy="0"/>
+          <a:chOff x="0" y="0"/>
+          <a:chExt cx="0" cy="0"/>
+        </a:xfrm>
+      </p:grpSpPr>
+    </p:spTree>
+    <p:extLst>
+      <p:ext uri="{BB962C8B-B14F-4D97-AF65-F5344CB8AC3E}">
+        <p14:creationId xmlns:p14="http://schemas.microsoft.com/office/powerpoint/2010/main" val="1661931884"/>
       </p:ext>
     </p:extLst>
   </p:cSld>
@@ -8585,16 +10791,12 @@
           <a:lstStyle/>
           <a:p>
             <a:r>
-              <a:rPr lang="fr-FR" dirty="0" err="1"/>
-              <a:t>Linear-Elastic</a:t>
-            </a:r>
-            <a:r>
               <a:rPr lang="fr-FR" dirty="0"/>
-              <a:t> </a:t>
+              <a:t>Membrane + </a:t>
             </a:r>
             <a:r>
               <a:rPr lang="fr-FR" dirty="0" err="1"/>
-              <a:t>Div</a:t>
+              <a:t>Bending</a:t>
             </a:r>
             <a:endParaRPr lang="fr-FR" dirty="0"/>
           </a:p>
@@ -8602,10 +10804,10 @@
       </p:sp>
       <p:grpSp>
         <p:nvGrpSpPr>
-          <p:cNvPr id="3" name="Groupe 2">
+          <p:cNvPr id="4" name="Groupe 3">
             <a:extLst>
               <a:ext uri="{FF2B5EF4-FFF2-40B4-BE49-F238E27FC236}">
-                <a16:creationId xmlns:a16="http://schemas.microsoft.com/office/drawing/2014/main" id="{A19F27DD-EE44-864D-A2BD-B949DB1798BC}"/>
+                <a16:creationId xmlns:a16="http://schemas.microsoft.com/office/drawing/2014/main" id="{2A61391A-0008-E843-B376-D39035CBE948}"/>
               </a:ext>
             </a:extLst>
           </p:cNvPr>
@@ -8886,12 +11088,15 @@
                   <a:latin typeface="Arial" panose="020B0604020202020204" pitchFamily="34" charset="0"/>
                   <a:cs typeface="Arial" panose="020B0604020202020204" pitchFamily="34" charset="0"/>
                 </a:rPr>
-                <a:t>2</a:t>
-              </a:r>
-              <a:endParaRPr lang="fr-FR" sz="1100" baseline="30000" dirty="0">
-                <a:latin typeface="Arial" panose="020B0604020202020204" pitchFamily="34" charset="0"/>
-                <a:cs typeface="Arial" panose="020B0604020202020204" pitchFamily="34" charset="0"/>
-              </a:endParaRPr>
+                <a:t>2x10</a:t>
+              </a:r>
+              <a:r>
+                <a:rPr lang="fr-FR" sz="1100" baseline="30000" dirty="0">
+                  <a:latin typeface="Arial" panose="020B0604020202020204" pitchFamily="34" charset="0"/>
+                  <a:cs typeface="Arial" panose="020B0604020202020204" pitchFamily="34" charset="0"/>
+                </a:rPr>
+                <a:t>-1</a:t>
+              </a:r>
             </a:p>
           </p:txBody>
         </p:sp>
@@ -8929,14 +11134,14 @@
                   <a:latin typeface="Arial" panose="020B0604020202020204" pitchFamily="34" charset="0"/>
                   <a:cs typeface="Arial" panose="020B0604020202020204" pitchFamily="34" charset="0"/>
                 </a:rPr>
-                <a:t>9x10</a:t>
+                <a:t>4x10</a:t>
               </a:r>
               <a:r>
                 <a:rPr lang="fr-FR" sz="1100" baseline="30000" dirty="0">
                   <a:latin typeface="Arial" panose="020B0604020202020204" pitchFamily="34" charset="0"/>
                   <a:cs typeface="Arial" panose="020B0604020202020204" pitchFamily="34" charset="0"/>
                 </a:rPr>
-                <a:t>-1</a:t>
+                <a:t>-2</a:t>
               </a:r>
             </a:p>
           </p:txBody>
@@ -8975,14 +11180,14 @@
                   <a:latin typeface="Arial" panose="020B0604020202020204" pitchFamily="34" charset="0"/>
                   <a:cs typeface="Arial" panose="020B0604020202020204" pitchFamily="34" charset="0"/>
                 </a:rPr>
-                <a:t>4x10</a:t>
+                <a:t>1x10</a:t>
               </a:r>
               <a:r>
                 <a:rPr lang="fr-FR" sz="1100" baseline="30000" dirty="0">
                   <a:latin typeface="Arial" panose="020B0604020202020204" pitchFamily="34" charset="0"/>
                   <a:cs typeface="Arial" panose="020B0604020202020204" pitchFamily="34" charset="0"/>
                 </a:rPr>
-                <a:t>-1</a:t>
+                <a:t>-2</a:t>
               </a:r>
             </a:p>
           </p:txBody>
@@ -9021,14 +11226,14 @@
                   <a:latin typeface="Arial" panose="020B0604020202020204" pitchFamily="34" charset="0"/>
                   <a:cs typeface="Arial" panose="020B0604020202020204" pitchFamily="34" charset="0"/>
                 </a:rPr>
-                <a:t>2x10</a:t>
+                <a:t>1x10</a:t>
               </a:r>
               <a:r>
                 <a:rPr lang="fr-FR" sz="1100" baseline="30000" dirty="0">
                   <a:latin typeface="Arial" panose="020B0604020202020204" pitchFamily="34" charset="0"/>
                   <a:cs typeface="Arial" panose="020B0604020202020204" pitchFamily="34" charset="0"/>
                 </a:rPr>
-                <a:t>-1</a:t>
+                <a:t>-3</a:t>
               </a:r>
             </a:p>
           </p:txBody>
@@ -9191,10 +11396,10 @@
         </p:sp>
         <p:pic>
           <p:nvPicPr>
-            <p:cNvPr id="27" name="Image 26">
-              <a:extLst>
-                <a:ext uri="{FF2B5EF4-FFF2-40B4-BE49-F238E27FC236}">
-                  <a16:creationId xmlns:a16="http://schemas.microsoft.com/office/drawing/2014/main" id="{DD98C583-2620-3D4D-872E-BBDDCA344B12}"/>
+            <p:cNvPr id="29" name="Image 28">
+              <a:extLst>
+                <a:ext uri="{FF2B5EF4-FFF2-40B4-BE49-F238E27FC236}">
+                  <a16:creationId xmlns:a16="http://schemas.microsoft.com/office/drawing/2014/main" id="{BE50DC27-6587-8543-BEC0-8565B00DD064}"/>
                 </a:ext>
               </a:extLst>
             </p:cNvPr>
@@ -9205,12 +11410,12 @@
           </p:nvPicPr>
           <p:blipFill rotWithShape="1">
             <a:blip r:embed="rId5"/>
-            <a:srcRect l="21250" t="7592" r="17639" b="10926"/>
+            <a:srcRect l="21282" t="7778" r="17820" b="11026"/>
             <a:stretch/>
           </p:blipFill>
           <p:spPr>
             <a:xfrm>
-              <a:off x="616421" y="1956622"/>
+              <a:off x="611766" y="1949022"/>
               <a:ext cx="2239200" cy="2239200"/>
             </a:xfrm>
             <a:prstGeom prst="rect">
@@ -9225,10 +11430,10 @@
         </p:pic>
         <p:pic>
           <p:nvPicPr>
-            <p:cNvPr id="35" name="Image 34">
-              <a:extLst>
-                <a:ext uri="{FF2B5EF4-FFF2-40B4-BE49-F238E27FC236}">
-                  <a16:creationId xmlns:a16="http://schemas.microsoft.com/office/drawing/2014/main" id="{40116D43-213A-0D4B-9B70-5D8460C9181F}"/>
+            <p:cNvPr id="30" name="Image 29">
+              <a:extLst>
+                <a:ext uri="{FF2B5EF4-FFF2-40B4-BE49-F238E27FC236}">
+                  <a16:creationId xmlns:a16="http://schemas.microsoft.com/office/drawing/2014/main" id="{D8CA2990-AFC2-9342-95E8-E181CEBB7A13}"/>
                 </a:ext>
               </a:extLst>
             </p:cNvPr>
@@ -9239,12 +11444,12 @@
           </p:nvPicPr>
           <p:blipFill rotWithShape="1">
             <a:blip r:embed="rId6"/>
-            <a:srcRect l="21250" t="7592" r="17639" b="10926"/>
+            <a:srcRect l="21282" t="7778" r="17820" b="11026"/>
             <a:stretch/>
           </p:blipFill>
           <p:spPr>
             <a:xfrm>
-              <a:off x="3603186" y="1956622"/>
+              <a:off x="3598032" y="1949022"/>
               <a:ext cx="2239200" cy="2239200"/>
             </a:xfrm>
             <a:prstGeom prst="rect">
@@ -9259,10 +11464,10 @@
         </p:pic>
         <p:pic>
           <p:nvPicPr>
-            <p:cNvPr id="36" name="Image 35">
-              <a:extLst>
-                <a:ext uri="{FF2B5EF4-FFF2-40B4-BE49-F238E27FC236}">
-                  <a16:creationId xmlns:a16="http://schemas.microsoft.com/office/drawing/2014/main" id="{92E3295E-1BE9-C349-A98A-7D4806D955D3}"/>
+            <p:cNvPr id="38" name="Image 37">
+              <a:extLst>
+                <a:ext uri="{FF2B5EF4-FFF2-40B4-BE49-F238E27FC236}">
+                  <a16:creationId xmlns:a16="http://schemas.microsoft.com/office/drawing/2014/main" id="{42281032-B184-4445-B53B-E76D696BD2AE}"/>
                 </a:ext>
               </a:extLst>
             </p:cNvPr>
@@ -9273,12 +11478,12 @@
           </p:nvPicPr>
           <p:blipFill rotWithShape="1">
             <a:blip r:embed="rId7"/>
-            <a:srcRect l="21250" t="7592" r="17639" b="10926"/>
+            <a:srcRect l="21282" t="7778" r="17820" b="11026"/>
             <a:stretch/>
           </p:blipFill>
           <p:spPr>
             <a:xfrm>
-              <a:off x="6584299" y="1956622"/>
+              <a:off x="6587554" y="1940531"/>
               <a:ext cx="2239200" cy="2239200"/>
             </a:xfrm>
             <a:prstGeom prst="rect">
@@ -9293,10 +11498,10 @@
         </p:pic>
         <p:pic>
           <p:nvPicPr>
-            <p:cNvPr id="37" name="Image 36">
-              <a:extLst>
-                <a:ext uri="{FF2B5EF4-FFF2-40B4-BE49-F238E27FC236}">
-                  <a16:creationId xmlns:a16="http://schemas.microsoft.com/office/drawing/2014/main" id="{C10C927C-59E5-CD43-ACA1-A8AB858E6B4E}"/>
+            <p:cNvPr id="39" name="Image 38">
+              <a:extLst>
+                <a:ext uri="{FF2B5EF4-FFF2-40B4-BE49-F238E27FC236}">
+                  <a16:creationId xmlns:a16="http://schemas.microsoft.com/office/drawing/2014/main" id="{3D2DBB99-B14B-5F42-ACB9-74EADD5F781C}"/>
                 </a:ext>
               </a:extLst>
             </p:cNvPr>
@@ -9307,12 +11512,12 @@
           </p:nvPicPr>
           <p:blipFill rotWithShape="1">
             <a:blip r:embed="rId8"/>
-            <a:srcRect l="21250" t="7592" r="17639" b="10926"/>
+            <a:srcRect l="21282" t="7777" r="17820" b="11026"/>
             <a:stretch/>
           </p:blipFill>
           <p:spPr>
             <a:xfrm>
-              <a:off x="9570562" y="1956622"/>
+              <a:off x="9571655" y="1951205"/>
               <a:ext cx="2239200" cy="2239200"/>
             </a:xfrm>
             <a:prstGeom prst="rect">

</xml_diff>